<commit_message>
working on presentation 02
</commit_message>
<xml_diff>
--- a/00-presentation/Frontend 102.pptx
+++ b/00-presentation/Frontend 102.pptx
@@ -5,7 +5,7 @@
     <p:sldMasterId id="2147483648" r:id="rId1"/>
   </p:sldMasterIdLst>
   <p:notesMasterIdLst>
-    <p:notesMasterId r:id="rId17"/>
+    <p:notesMasterId r:id="rId25"/>
   </p:notesMasterIdLst>
   <p:sldIdLst>
     <p:sldId id="256" r:id="rId2"/>
@@ -23,6 +23,14 @@
     <p:sldId id="268" r:id="rId14"/>
     <p:sldId id="269" r:id="rId15"/>
     <p:sldId id="270" r:id="rId16"/>
+    <p:sldId id="271" r:id="rId17"/>
+    <p:sldId id="272" r:id="rId18"/>
+    <p:sldId id="273" r:id="rId19"/>
+    <p:sldId id="274" r:id="rId20"/>
+    <p:sldId id="275" r:id="rId21"/>
+    <p:sldId id="276" r:id="rId22"/>
+    <p:sldId id="277" r:id="rId23"/>
+    <p:sldId id="278" r:id="rId24"/>
   </p:sldIdLst>
   <p:sldSz cx="9144000" cy="6858000" type="screen4x3"/>
   <p:notesSz cx="6858000" cy="9144000"/>
@@ -141,6 +149,14 @@
             <p14:sldId id="268"/>
             <p14:sldId id="269"/>
             <p14:sldId id="270"/>
+            <p14:sldId id="271"/>
+            <p14:sldId id="272"/>
+            <p14:sldId id="273"/>
+            <p14:sldId id="274"/>
+            <p14:sldId id="275"/>
+            <p14:sldId id="276"/>
+            <p14:sldId id="277"/>
+            <p14:sldId id="278"/>
           </p14:sldIdLst>
         </p14:section>
       </p14:sectionLst>
@@ -245,7 +261,7 @@
           <a:p>
             <a:fld id="{FE6E0087-205E-475D-B9F7-441EAED58169}" type="datetimeFigureOut">
               <a:rPr lang="ru-RU" smtClean="0"/>
-              <a:t>13.10.2019</a:t>
+              <a:t>14.10.2019</a:t>
             </a:fld>
             <a:endParaRPr lang="ru-RU"/>
           </a:p>
@@ -694,7 +710,7 @@
           <a:p>
             <a:fld id="{0D602453-4147-4C7A-BDB0-0580C07D47BF}" type="datetimeFigureOut">
               <a:rPr lang="ru-RU" smtClean="0"/>
-              <a:t>13.10.2019</a:t>
+              <a:t>14.10.2019</a:t>
             </a:fld>
             <a:endParaRPr lang="ru-RU"/>
           </a:p>
@@ -864,7 +880,7 @@
           <a:p>
             <a:fld id="{0D602453-4147-4C7A-BDB0-0580C07D47BF}" type="datetimeFigureOut">
               <a:rPr lang="ru-RU" smtClean="0"/>
-              <a:t>13.10.2019</a:t>
+              <a:t>14.10.2019</a:t>
             </a:fld>
             <a:endParaRPr lang="ru-RU"/>
           </a:p>
@@ -1044,7 +1060,7 @@
           <a:p>
             <a:fld id="{0D602453-4147-4C7A-BDB0-0580C07D47BF}" type="datetimeFigureOut">
               <a:rPr lang="ru-RU" smtClean="0"/>
-              <a:t>13.10.2019</a:t>
+              <a:t>14.10.2019</a:t>
             </a:fld>
             <a:endParaRPr lang="ru-RU"/>
           </a:p>
@@ -1214,7 +1230,7 @@
           <a:p>
             <a:fld id="{0D602453-4147-4C7A-BDB0-0580C07D47BF}" type="datetimeFigureOut">
               <a:rPr lang="ru-RU" smtClean="0"/>
-              <a:t>13.10.2019</a:t>
+              <a:t>14.10.2019</a:t>
             </a:fld>
             <a:endParaRPr lang="ru-RU"/>
           </a:p>
@@ -1460,7 +1476,7 @@
           <a:p>
             <a:fld id="{0D602453-4147-4C7A-BDB0-0580C07D47BF}" type="datetimeFigureOut">
               <a:rPr lang="ru-RU" smtClean="0"/>
-              <a:t>13.10.2019</a:t>
+              <a:t>14.10.2019</a:t>
             </a:fld>
             <a:endParaRPr lang="ru-RU"/>
           </a:p>
@@ -1748,7 +1764,7 @@
           <a:p>
             <a:fld id="{0D602453-4147-4C7A-BDB0-0580C07D47BF}" type="datetimeFigureOut">
               <a:rPr lang="ru-RU" smtClean="0"/>
-              <a:t>13.10.2019</a:t>
+              <a:t>14.10.2019</a:t>
             </a:fld>
             <a:endParaRPr lang="ru-RU"/>
           </a:p>
@@ -2170,7 +2186,7 @@
           <a:p>
             <a:fld id="{0D602453-4147-4C7A-BDB0-0580C07D47BF}" type="datetimeFigureOut">
               <a:rPr lang="ru-RU" smtClean="0"/>
-              <a:t>13.10.2019</a:t>
+              <a:t>14.10.2019</a:t>
             </a:fld>
             <a:endParaRPr lang="ru-RU"/>
           </a:p>
@@ -2288,7 +2304,7 @@
           <a:p>
             <a:fld id="{0D602453-4147-4C7A-BDB0-0580C07D47BF}" type="datetimeFigureOut">
               <a:rPr lang="ru-RU" smtClean="0"/>
-              <a:t>13.10.2019</a:t>
+              <a:t>14.10.2019</a:t>
             </a:fld>
             <a:endParaRPr lang="ru-RU"/>
           </a:p>
@@ -2383,7 +2399,7 @@
           <a:p>
             <a:fld id="{0D602453-4147-4C7A-BDB0-0580C07D47BF}" type="datetimeFigureOut">
               <a:rPr lang="ru-RU" smtClean="0"/>
-              <a:t>13.10.2019</a:t>
+              <a:t>14.10.2019</a:t>
             </a:fld>
             <a:endParaRPr lang="ru-RU"/>
           </a:p>
@@ -2660,7 +2676,7 @@
           <a:p>
             <a:fld id="{0D602453-4147-4C7A-BDB0-0580C07D47BF}" type="datetimeFigureOut">
               <a:rPr lang="ru-RU" smtClean="0"/>
-              <a:t>13.10.2019</a:t>
+              <a:t>14.10.2019</a:t>
             </a:fld>
             <a:endParaRPr lang="ru-RU"/>
           </a:p>
@@ -2913,7 +2929,7 @@
           <a:p>
             <a:fld id="{0D602453-4147-4C7A-BDB0-0580C07D47BF}" type="datetimeFigureOut">
               <a:rPr lang="ru-RU" smtClean="0"/>
-              <a:t>13.10.2019</a:t>
+              <a:t>14.10.2019</a:t>
             </a:fld>
             <a:endParaRPr lang="ru-RU"/>
           </a:p>
@@ -3126,7 +3142,7 @@
           <a:p>
             <a:fld id="{0D602453-4147-4C7A-BDB0-0580C07D47BF}" type="datetimeFigureOut">
               <a:rPr lang="ru-RU" smtClean="0"/>
-              <a:t>13.10.2019</a:t>
+              <a:t>14.10.2019</a:t>
             </a:fld>
             <a:endParaRPr lang="ru-RU"/>
           </a:p>
@@ -3561,19 +3577,7 @@
                   </a:outerShdw>
                 </a:effectLst>
               </a:rPr>
-              <a:t>Frontend </a:t>
-            </a:r>
-            <a:r>
-              <a:rPr lang="en-US" b="1" dirty="0" smtClean="0">
-                <a:effectLst>
-                  <a:outerShdw blurRad="38100" dist="38100" dir="2700000" algn="tl">
-                    <a:srgbClr val="000000">
-                      <a:alpha val="43137"/>
-                    </a:srgbClr>
-                  </a:outerShdw>
-                </a:effectLst>
-              </a:rPr>
-              <a:t>102</a:t>
+              <a:t>Frontend 102</a:t>
             </a:r>
             <a:endParaRPr lang="ru-RU" sz="6000" b="1" dirty="0">
               <a:effectLst>
@@ -4338,6 +4342,699 @@
 </p:sld>
 </file>
 
+<file path=ppt/slides/slide16.xml><?xml version="1.0" encoding="utf-8"?>
+<p:sld xmlns:a="http://schemas.openxmlformats.org/drawingml/2006/main" xmlns:r="http://schemas.openxmlformats.org/officeDocument/2006/relationships" xmlns:p="http://schemas.openxmlformats.org/presentationml/2006/main">
+  <p:cSld>
+    <p:bg>
+      <p:bgPr>
+        <a:solidFill>
+          <a:srgbClr val="8BC34A"/>
+        </a:solidFill>
+        <a:effectLst/>
+      </p:bgPr>
+    </p:bg>
+    <p:spTree>
+      <p:nvGrpSpPr>
+        <p:cNvPr id="1" name=""/>
+        <p:cNvGrpSpPr/>
+        <p:nvPr/>
+      </p:nvGrpSpPr>
+      <p:grpSpPr>
+        <a:xfrm>
+          <a:off x="0" y="0"/>
+          <a:ext cx="0" cy="0"/>
+          <a:chOff x="0" y="0"/>
+          <a:chExt cx="0" cy="0"/>
+        </a:xfrm>
+      </p:grpSpPr>
+      <p:sp>
+        <p:nvSpPr>
+          <p:cNvPr id="2" name="Заголовок 1"/>
+          <p:cNvSpPr>
+            <a:spLocks noGrp="1"/>
+          </p:cNvSpPr>
+          <p:nvPr>
+            <p:ph type="title"/>
+          </p:nvPr>
+        </p:nvSpPr>
+        <p:spPr/>
+        <p:txBody>
+          <a:bodyPr/>
+          <a:lstStyle/>
+          <a:p>
+            <a:r>
+              <a:rPr lang="ru-RU" dirty="0" smtClean="0"/>
+              <a:t>Селектор </a:t>
+            </a:r>
+            <a:r>
+              <a:rPr lang="ru-RU" dirty="0" err="1" smtClean="0"/>
+              <a:t>псевдоклассов</a:t>
+            </a:r>
+            <a:endParaRPr lang="ru-RU" dirty="0"/>
+          </a:p>
+        </p:txBody>
+      </p:sp>
+      <p:sp>
+        <p:nvSpPr>
+          <p:cNvPr id="3" name="Объект 2"/>
+          <p:cNvSpPr>
+            <a:spLocks noGrp="1"/>
+          </p:cNvSpPr>
+          <p:nvPr>
+            <p:ph idx="1"/>
+          </p:nvPr>
+        </p:nvSpPr>
+        <p:spPr/>
+        <p:txBody>
+          <a:bodyPr/>
+          <a:lstStyle/>
+          <a:p>
+            <a:endParaRPr lang="ru-RU" dirty="0" smtClean="0"/>
+          </a:p>
+          <a:p>
+            <a:pPr marL="0" indent="0">
+              <a:buNone/>
+            </a:pPr>
+            <a:r>
+              <a:rPr lang="en-US" dirty="0" smtClean="0"/>
+              <a:t>a:active </a:t>
+            </a:r>
+            <a:r>
+              <a:rPr lang="en-US" dirty="0"/>
+              <a:t>{</a:t>
+            </a:r>
+          </a:p>
+          <a:p>
+            <a:pPr marL="0" indent="0">
+              <a:buNone/>
+            </a:pPr>
+            <a:r>
+              <a:rPr lang="en-US" dirty="0"/>
+              <a:t>   color: blue;</a:t>
+            </a:r>
+          </a:p>
+          <a:p>
+            <a:pPr marL="0" indent="0">
+              <a:buNone/>
+            </a:pPr>
+            <a:r>
+              <a:rPr lang="en-US" dirty="0"/>
+              <a:t>}</a:t>
+            </a:r>
+            <a:endParaRPr lang="ru-RU" dirty="0"/>
+          </a:p>
+        </p:txBody>
+      </p:sp>
+    </p:spTree>
+    <p:extLst>
+      <p:ext uri="{BB962C8B-B14F-4D97-AF65-F5344CB8AC3E}">
+        <p14:creationId xmlns:p14="http://schemas.microsoft.com/office/powerpoint/2010/main" val="2604966452"/>
+      </p:ext>
+    </p:extLst>
+  </p:cSld>
+  <p:clrMapOvr>
+    <a:masterClrMapping/>
+  </p:clrMapOvr>
+</p:sld>
+</file>
+
+<file path=ppt/slides/slide17.xml><?xml version="1.0" encoding="utf-8"?>
+<p:sld xmlns:a="http://schemas.openxmlformats.org/drawingml/2006/main" xmlns:r="http://schemas.openxmlformats.org/officeDocument/2006/relationships" xmlns:p="http://schemas.openxmlformats.org/presentationml/2006/main">
+  <p:cSld>
+    <p:bg>
+      <p:bgPr>
+        <a:solidFill>
+          <a:srgbClr val="8BC34A"/>
+        </a:solidFill>
+        <a:effectLst/>
+      </p:bgPr>
+    </p:bg>
+    <p:spTree>
+      <p:nvGrpSpPr>
+        <p:cNvPr id="1" name=""/>
+        <p:cNvGrpSpPr/>
+        <p:nvPr/>
+      </p:nvGrpSpPr>
+      <p:grpSpPr>
+        <a:xfrm>
+          <a:off x="0" y="0"/>
+          <a:ext cx="0" cy="0"/>
+          <a:chOff x="0" y="0"/>
+          <a:chExt cx="0" cy="0"/>
+        </a:xfrm>
+      </p:grpSpPr>
+      <p:sp>
+        <p:nvSpPr>
+          <p:cNvPr id="2" name="Заголовок 1"/>
+          <p:cNvSpPr>
+            <a:spLocks noGrp="1"/>
+          </p:cNvSpPr>
+          <p:nvPr>
+            <p:ph type="title"/>
+          </p:nvPr>
+        </p:nvSpPr>
+        <p:spPr/>
+        <p:txBody>
+          <a:bodyPr/>
+          <a:lstStyle/>
+          <a:p>
+            <a:r>
+              <a:rPr lang="ru-RU" dirty="0" smtClean="0"/>
+              <a:t>Селектор </a:t>
+            </a:r>
+            <a:r>
+              <a:rPr lang="ru-RU" dirty="0" err="1" smtClean="0"/>
+              <a:t>псевдоэлементов</a:t>
+            </a:r>
+            <a:endParaRPr lang="ru-RU" dirty="0"/>
+          </a:p>
+        </p:txBody>
+      </p:sp>
+      <p:sp>
+        <p:nvSpPr>
+          <p:cNvPr id="3" name="Объект 2"/>
+          <p:cNvSpPr>
+            <a:spLocks noGrp="1"/>
+          </p:cNvSpPr>
+          <p:nvPr>
+            <p:ph idx="1"/>
+          </p:nvPr>
+        </p:nvSpPr>
+        <p:spPr/>
+        <p:txBody>
+          <a:bodyPr>
+            <a:normAutofit fontScale="77500" lnSpcReduction="20000"/>
+          </a:bodyPr>
+          <a:lstStyle/>
+          <a:p>
+            <a:pPr marL="0" indent="0">
+              <a:buNone/>
+            </a:pPr>
+            <a:endParaRPr lang="ru-RU" dirty="0" smtClean="0"/>
+          </a:p>
+          <a:p>
+            <a:pPr marL="0" indent="0">
+              <a:buNone/>
+            </a:pPr>
+            <a:r>
+              <a:rPr lang="en-US" dirty="0" smtClean="0"/>
+              <a:t>p</a:t>
+            </a:r>
+            <a:r>
+              <a:rPr lang="en-US" dirty="0"/>
+              <a:t>::first-letter {</a:t>
+            </a:r>
+          </a:p>
+          <a:p>
+            <a:pPr marL="0" indent="0">
+              <a:buNone/>
+            </a:pPr>
+            <a:r>
+              <a:rPr lang="en-US" dirty="0"/>
+              <a:t>   font-size: 32px;</a:t>
+            </a:r>
+          </a:p>
+          <a:p>
+            <a:pPr marL="0" indent="0">
+              <a:buNone/>
+            </a:pPr>
+            <a:r>
+              <a:rPr lang="en-US" dirty="0" smtClean="0"/>
+              <a:t>}</a:t>
+            </a:r>
+            <a:endParaRPr lang="ru-RU" dirty="0" smtClean="0"/>
+          </a:p>
+          <a:p>
+            <a:pPr marL="0" indent="0">
+              <a:buNone/>
+            </a:pPr>
+            <a:endParaRPr lang="ru-RU" dirty="0"/>
+          </a:p>
+          <a:p>
+            <a:pPr marL="0" indent="0">
+              <a:buNone/>
+            </a:pPr>
+            <a:r>
+              <a:rPr lang="en-US" dirty="0"/>
+              <a:t>p</a:t>
+            </a:r>
+            <a:r>
+              <a:rPr lang="en-US" dirty="0" smtClean="0"/>
+              <a:t>::before {</a:t>
+            </a:r>
+          </a:p>
+          <a:p>
+            <a:pPr marL="0" indent="0">
+              <a:buNone/>
+            </a:pPr>
+            <a:r>
+              <a:rPr lang="en-US" dirty="0"/>
+              <a:t> </a:t>
+            </a:r>
+            <a:r>
+              <a:rPr lang="en-US" dirty="0" smtClean="0"/>
+              <a:t>  content: ‘ ’;</a:t>
+            </a:r>
+          </a:p>
+          <a:p>
+            <a:pPr marL="0" indent="0">
+              <a:buNone/>
+            </a:pPr>
+            <a:r>
+              <a:rPr lang="en-US" dirty="0"/>
+              <a:t> </a:t>
+            </a:r>
+            <a:r>
+              <a:rPr lang="en-US" dirty="0" smtClean="0"/>
+              <a:t>  display: block;</a:t>
+            </a:r>
+          </a:p>
+          <a:p>
+            <a:pPr marL="0" indent="0">
+              <a:buNone/>
+            </a:pPr>
+            <a:r>
+              <a:rPr lang="en-US" dirty="0"/>
+              <a:t> </a:t>
+            </a:r>
+            <a:r>
+              <a:rPr lang="en-US" dirty="0" smtClean="0"/>
+              <a:t>  width: 100%;</a:t>
+            </a:r>
+            <a:endParaRPr lang="en-US" dirty="0"/>
+          </a:p>
+          <a:p>
+            <a:pPr marL="0" indent="0">
+              <a:buNone/>
+            </a:pPr>
+            <a:r>
+              <a:rPr lang="en-US" dirty="0"/>
+              <a:t>   font-size: 32px;</a:t>
+            </a:r>
+          </a:p>
+          <a:p>
+            <a:pPr marL="0" indent="0">
+              <a:buNone/>
+            </a:pPr>
+            <a:r>
+              <a:rPr lang="en-US" dirty="0"/>
+              <a:t>}</a:t>
+            </a:r>
+            <a:endParaRPr lang="ru-RU" dirty="0"/>
+          </a:p>
+        </p:txBody>
+      </p:sp>
+    </p:spTree>
+    <p:extLst>
+      <p:ext uri="{BB962C8B-B14F-4D97-AF65-F5344CB8AC3E}">
+        <p14:creationId xmlns:p14="http://schemas.microsoft.com/office/powerpoint/2010/main" val="3122624641"/>
+      </p:ext>
+    </p:extLst>
+  </p:cSld>
+  <p:clrMapOvr>
+    <a:masterClrMapping/>
+  </p:clrMapOvr>
+</p:sld>
+</file>
+
+<file path=ppt/slides/slide18.xml><?xml version="1.0" encoding="utf-8"?>
+<p:sld xmlns:a="http://schemas.openxmlformats.org/drawingml/2006/main" xmlns:r="http://schemas.openxmlformats.org/officeDocument/2006/relationships" xmlns:p="http://schemas.openxmlformats.org/presentationml/2006/main">
+  <p:cSld>
+    <p:bg>
+      <p:bgPr>
+        <a:solidFill>
+          <a:schemeClr val="accent5">
+            <a:lumMod val="40000"/>
+            <a:lumOff val="60000"/>
+          </a:schemeClr>
+        </a:solidFill>
+        <a:effectLst/>
+      </p:bgPr>
+    </p:bg>
+    <p:spTree>
+      <p:nvGrpSpPr>
+        <p:cNvPr id="1" name=""/>
+        <p:cNvGrpSpPr/>
+        <p:nvPr/>
+      </p:nvGrpSpPr>
+      <p:grpSpPr>
+        <a:xfrm>
+          <a:off x="0" y="0"/>
+          <a:ext cx="0" cy="0"/>
+          <a:chOff x="0" y="0"/>
+          <a:chExt cx="0" cy="0"/>
+        </a:xfrm>
+      </p:grpSpPr>
+      <p:sp>
+        <p:nvSpPr>
+          <p:cNvPr id="2" name="Заголовок 1"/>
+          <p:cNvSpPr>
+            <a:spLocks noGrp="1"/>
+          </p:cNvSpPr>
+          <p:nvPr>
+            <p:ph type="title"/>
+          </p:nvPr>
+        </p:nvSpPr>
+        <p:spPr/>
+        <p:txBody>
+          <a:bodyPr/>
+          <a:lstStyle/>
+          <a:p>
+            <a:r>
+              <a:rPr lang="ru-RU" dirty="0" smtClean="0"/>
+              <a:t>Некоторые свойства </a:t>
+            </a:r>
+            <a:r>
+              <a:rPr lang="en-US" dirty="0" smtClean="0"/>
+              <a:t>CSS</a:t>
+            </a:r>
+            <a:endParaRPr lang="ru-RU" dirty="0"/>
+          </a:p>
+        </p:txBody>
+      </p:sp>
+      <p:sp>
+        <p:nvSpPr>
+          <p:cNvPr id="3" name="Объект 2"/>
+          <p:cNvSpPr>
+            <a:spLocks noGrp="1"/>
+          </p:cNvSpPr>
+          <p:nvPr>
+            <p:ph idx="1"/>
+          </p:nvPr>
+        </p:nvSpPr>
+        <p:spPr/>
+        <p:txBody>
+          <a:bodyPr/>
+          <a:lstStyle/>
+          <a:p>
+            <a:pPr marL="0" indent="0">
+              <a:buNone/>
+            </a:pPr>
+            <a:r>
+              <a:rPr lang="en-US" dirty="0" smtClean="0"/>
+              <a:t>display,</a:t>
+            </a:r>
+          </a:p>
+          <a:p>
+            <a:pPr marL="0" indent="0">
+              <a:buNone/>
+            </a:pPr>
+            <a:r>
+              <a:rPr lang="en-US" dirty="0" smtClean="0"/>
+              <a:t>width, height, margin, padding</a:t>
+            </a:r>
+          </a:p>
+          <a:p>
+            <a:pPr marL="0" indent="0">
+              <a:buNone/>
+            </a:pPr>
+            <a:r>
+              <a:rPr lang="en-US" dirty="0" smtClean="0"/>
+              <a:t>border, border-radius,</a:t>
+            </a:r>
+          </a:p>
+          <a:p>
+            <a:pPr marL="0" indent="0">
+              <a:buNone/>
+            </a:pPr>
+            <a:r>
+              <a:rPr lang="en-US" dirty="0" smtClean="0"/>
+              <a:t>background, color,</a:t>
+            </a:r>
+            <a:endParaRPr lang="ru-RU" dirty="0" smtClean="0"/>
+          </a:p>
+          <a:p>
+            <a:pPr marL="0" indent="0">
+              <a:buNone/>
+            </a:pPr>
+            <a:r>
+              <a:rPr lang="en-US" dirty="0" smtClean="0"/>
+              <a:t>font-family, font-size, font-style, font-weight,</a:t>
+            </a:r>
+          </a:p>
+          <a:p>
+            <a:pPr marL="0" indent="0">
+              <a:buNone/>
+            </a:pPr>
+            <a:r>
+              <a:rPr lang="en-US" dirty="0" smtClean="0"/>
+              <a:t>text-decoration, text-transform,</a:t>
+            </a:r>
+          </a:p>
+          <a:p>
+            <a:pPr marL="0" indent="0">
+              <a:buNone/>
+            </a:pPr>
+            <a:r>
+              <a:rPr lang="en-US" dirty="0" smtClean="0"/>
+              <a:t>list-style</a:t>
+            </a:r>
+          </a:p>
+        </p:txBody>
+      </p:sp>
+    </p:spTree>
+    <p:extLst>
+      <p:ext uri="{BB962C8B-B14F-4D97-AF65-F5344CB8AC3E}">
+        <p14:creationId xmlns:p14="http://schemas.microsoft.com/office/powerpoint/2010/main" val="867075156"/>
+      </p:ext>
+    </p:extLst>
+  </p:cSld>
+  <p:clrMapOvr>
+    <a:masterClrMapping/>
+  </p:clrMapOvr>
+</p:sld>
+</file>
+
+<file path=ppt/slides/slide19.xml><?xml version="1.0" encoding="utf-8"?>
+<p:sld xmlns:a="http://schemas.openxmlformats.org/drawingml/2006/main" xmlns:r="http://schemas.openxmlformats.org/officeDocument/2006/relationships" xmlns:p="http://schemas.openxmlformats.org/presentationml/2006/main">
+  <p:cSld>
+    <p:bg>
+      <p:bgPr>
+        <a:solidFill>
+          <a:srgbClr val="8BC34A"/>
+        </a:solidFill>
+        <a:effectLst/>
+      </p:bgPr>
+    </p:bg>
+    <p:spTree>
+      <p:nvGrpSpPr>
+        <p:cNvPr id="1" name=""/>
+        <p:cNvGrpSpPr/>
+        <p:nvPr/>
+      </p:nvGrpSpPr>
+      <p:grpSpPr>
+        <a:xfrm>
+          <a:off x="0" y="0"/>
+          <a:ext cx="0" cy="0"/>
+          <a:chOff x="0" y="0"/>
+          <a:chExt cx="0" cy="0"/>
+        </a:xfrm>
+      </p:grpSpPr>
+      <p:sp>
+        <p:nvSpPr>
+          <p:cNvPr id="2" name="Заголовок 1"/>
+          <p:cNvSpPr>
+            <a:spLocks noGrp="1"/>
+          </p:cNvSpPr>
+          <p:nvPr>
+            <p:ph type="title"/>
+          </p:nvPr>
+        </p:nvSpPr>
+        <p:spPr/>
+        <p:txBody>
+          <a:bodyPr/>
+          <a:lstStyle/>
+          <a:p>
+            <a:r>
+              <a:rPr lang="en-US" dirty="0" smtClean="0"/>
+              <a:t>display</a:t>
+            </a:r>
+            <a:endParaRPr lang="ru-RU" dirty="0"/>
+          </a:p>
+        </p:txBody>
+      </p:sp>
+      <p:sp>
+        <p:nvSpPr>
+          <p:cNvPr id="3" name="Объект 2"/>
+          <p:cNvSpPr>
+            <a:spLocks noGrp="1"/>
+          </p:cNvSpPr>
+          <p:nvPr>
+            <p:ph idx="1"/>
+          </p:nvPr>
+        </p:nvSpPr>
+        <p:spPr/>
+        <p:txBody>
+          <a:bodyPr/>
+          <a:lstStyle/>
+          <a:p>
+            <a:r>
+              <a:rPr lang="ru-RU" dirty="0" smtClean="0"/>
+              <a:t>Свойство </a:t>
+            </a:r>
+            <a:r>
+              <a:rPr lang="en-US" dirty="0" smtClean="0"/>
+              <a:t>display </a:t>
+            </a:r>
+            <a:r>
+              <a:rPr lang="ru-RU" dirty="0" smtClean="0"/>
+              <a:t>управляет типом элемента.</a:t>
+            </a:r>
+            <a:endParaRPr lang="en-US" dirty="0" smtClean="0"/>
+          </a:p>
+          <a:p>
+            <a:endParaRPr lang="ru-RU" dirty="0" smtClean="0"/>
+          </a:p>
+          <a:p>
+            <a:r>
+              <a:rPr lang="en-US" dirty="0"/>
+              <a:t>d</a:t>
+            </a:r>
+            <a:r>
+              <a:rPr lang="en-US" dirty="0" smtClean="0"/>
+              <a:t>isplay: block; </a:t>
+            </a:r>
+            <a:r>
+              <a:rPr lang="en-US" dirty="0" smtClean="0">
+                <a:solidFill>
+                  <a:schemeClr val="bg1">
+                    <a:lumMod val="95000"/>
+                  </a:schemeClr>
+                </a:solidFill>
+              </a:rPr>
+              <a:t>- </a:t>
+            </a:r>
+            <a:r>
+              <a:rPr lang="ru-RU" dirty="0" smtClean="0">
+                <a:solidFill>
+                  <a:schemeClr val="bg1">
+                    <a:lumMod val="95000"/>
+                  </a:schemeClr>
+                </a:solidFill>
+              </a:rPr>
+              <a:t>блочный элемент</a:t>
+            </a:r>
+          </a:p>
+          <a:p>
+            <a:r>
+              <a:rPr lang="en-US" dirty="0" smtClean="0"/>
+              <a:t>display: inline; </a:t>
+            </a:r>
+            <a:r>
+              <a:rPr lang="en-US" dirty="0" smtClean="0">
+                <a:solidFill>
+                  <a:schemeClr val="bg1">
+                    <a:lumMod val="95000"/>
+                  </a:schemeClr>
+                </a:solidFill>
+              </a:rPr>
+              <a:t>- </a:t>
+            </a:r>
+            <a:r>
+              <a:rPr lang="ru-RU" dirty="0" smtClean="0">
+                <a:solidFill>
+                  <a:schemeClr val="bg1">
+                    <a:lumMod val="95000"/>
+                  </a:schemeClr>
+                </a:solidFill>
+              </a:rPr>
+              <a:t>строчный элемент</a:t>
+            </a:r>
+            <a:endParaRPr lang="en-US" dirty="0" smtClean="0">
+              <a:solidFill>
+                <a:schemeClr val="bg1">
+                  <a:lumMod val="95000"/>
+                </a:schemeClr>
+              </a:solidFill>
+            </a:endParaRPr>
+          </a:p>
+          <a:p>
+            <a:r>
+              <a:rPr lang="en-US" dirty="0" smtClean="0"/>
+              <a:t>display: inline-block; </a:t>
+            </a:r>
+            <a:r>
+              <a:rPr lang="en-US" dirty="0" smtClean="0">
+                <a:solidFill>
+                  <a:schemeClr val="bg1">
+                    <a:lumMod val="95000"/>
+                  </a:schemeClr>
+                </a:solidFill>
+              </a:rPr>
+              <a:t>- </a:t>
+            </a:r>
+            <a:r>
+              <a:rPr lang="ru-RU" dirty="0" smtClean="0">
+                <a:solidFill>
+                  <a:schemeClr val="bg1">
+                    <a:lumMod val="95000"/>
+                  </a:schemeClr>
+                </a:solidFill>
+              </a:rPr>
+              <a:t>сточно-блочный</a:t>
+            </a:r>
+          </a:p>
+          <a:p>
+            <a:r>
+              <a:rPr lang="en-US" dirty="0" smtClean="0"/>
+              <a:t>display: flex; </a:t>
+            </a:r>
+            <a:r>
+              <a:rPr lang="en-US" dirty="0" smtClean="0">
+                <a:solidFill>
+                  <a:schemeClr val="bg1">
+                    <a:lumMod val="95000"/>
+                  </a:schemeClr>
+                </a:solidFill>
+              </a:rPr>
+              <a:t>- </a:t>
+            </a:r>
+            <a:r>
+              <a:rPr lang="ru-RU" dirty="0" err="1" smtClean="0">
+                <a:solidFill>
+                  <a:schemeClr val="bg1">
+                    <a:lumMod val="95000"/>
+                  </a:schemeClr>
+                </a:solidFill>
+              </a:rPr>
+              <a:t>флекс</a:t>
+            </a:r>
+            <a:r>
+              <a:rPr lang="ru-RU" dirty="0" smtClean="0">
+                <a:solidFill>
+                  <a:schemeClr val="bg1">
+                    <a:lumMod val="95000"/>
+                  </a:schemeClr>
+                </a:solidFill>
+              </a:rPr>
+              <a:t> контейнер</a:t>
+            </a:r>
+          </a:p>
+          <a:p>
+            <a:pPr marL="0" indent="0">
+              <a:buNone/>
+            </a:pPr>
+            <a:r>
+              <a:rPr lang="en-US" dirty="0" smtClean="0"/>
+              <a:t> </a:t>
+            </a:r>
+            <a:endParaRPr lang="ru-RU" dirty="0"/>
+          </a:p>
+        </p:txBody>
+      </p:sp>
+    </p:spTree>
+    <p:extLst>
+      <p:ext uri="{BB962C8B-B14F-4D97-AF65-F5344CB8AC3E}">
+        <p14:creationId xmlns:p14="http://schemas.microsoft.com/office/powerpoint/2010/main" val="3202325216"/>
+      </p:ext>
+    </p:extLst>
+  </p:cSld>
+  <p:clrMapOvr>
+    <a:masterClrMapping/>
+  </p:clrMapOvr>
+</p:sld>
+</file>
+
 <file path=ppt/slides/slide2.xml><?xml version="1.0" encoding="utf-8"?>
 <p:sld xmlns:a="http://schemas.openxmlformats.org/drawingml/2006/main" xmlns:r="http://schemas.openxmlformats.org/officeDocument/2006/relationships" xmlns:p="http://schemas.openxmlformats.org/presentationml/2006/main">
   <p:cSld>
@@ -4476,20 +5173,6 @@
               </a:rPr>
               <a:t>Структура проекта. Пути к файлам.</a:t>
             </a:r>
-            <a:endParaRPr lang="ru-RU" dirty="0" smtClean="0">
-              <a:solidFill>
-                <a:schemeClr val="bg1">
-                  <a:lumMod val="95000"/>
-                </a:schemeClr>
-              </a:solidFill>
-              <a:effectLst>
-                <a:outerShdw blurRad="38100" dist="38100" dir="2700000" algn="tl">
-                  <a:srgbClr val="000000">
-                    <a:alpha val="43137"/>
-                  </a:srgbClr>
-                </a:outerShdw>
-              </a:effectLst>
-            </a:endParaRPr>
           </a:p>
           <a:p>
             <a:r>
@@ -4578,20 +5261,6 @@
               </a:rPr>
               <a:t>Способы подключения.</a:t>
             </a:r>
-            <a:endParaRPr lang="ru-RU" dirty="0" smtClean="0">
-              <a:solidFill>
-                <a:schemeClr val="bg1">
-                  <a:lumMod val="95000"/>
-                </a:schemeClr>
-              </a:solidFill>
-              <a:effectLst>
-                <a:outerShdw blurRad="38100" dist="38100" dir="2700000" algn="tl">
-                  <a:srgbClr val="000000">
-                    <a:alpha val="43137"/>
-                  </a:srgbClr>
-                </a:outerShdw>
-              </a:effectLst>
-            </a:endParaRPr>
           </a:p>
           <a:p>
             <a:r>
@@ -4725,6 +5394,642 @@
       </p:par>
     </p:tnLst>
   </p:timing>
+</p:sld>
+</file>
+
+<file path=ppt/slides/slide20.xml><?xml version="1.0" encoding="utf-8"?>
+<p:sld xmlns:a="http://schemas.openxmlformats.org/drawingml/2006/main" xmlns:r="http://schemas.openxmlformats.org/officeDocument/2006/relationships" xmlns:p="http://schemas.openxmlformats.org/presentationml/2006/main">
+  <p:cSld>
+    <p:bg>
+      <p:bgPr>
+        <a:solidFill>
+          <a:srgbClr val="8BC34A"/>
+        </a:solidFill>
+        <a:effectLst/>
+      </p:bgPr>
+    </p:bg>
+    <p:spTree>
+      <p:nvGrpSpPr>
+        <p:cNvPr id="1" name=""/>
+        <p:cNvGrpSpPr/>
+        <p:nvPr/>
+      </p:nvGrpSpPr>
+      <p:grpSpPr>
+        <a:xfrm>
+          <a:off x="0" y="0"/>
+          <a:ext cx="0" cy="0"/>
+          <a:chOff x="0" y="0"/>
+          <a:chExt cx="0" cy="0"/>
+        </a:xfrm>
+      </p:grpSpPr>
+      <p:sp>
+        <p:nvSpPr>
+          <p:cNvPr id="2" name="Заголовок 1"/>
+          <p:cNvSpPr>
+            <a:spLocks noGrp="1"/>
+          </p:cNvSpPr>
+          <p:nvPr>
+            <p:ph type="title"/>
+          </p:nvPr>
+        </p:nvSpPr>
+        <p:spPr/>
+        <p:txBody>
+          <a:bodyPr/>
+          <a:lstStyle/>
+          <a:p>
+            <a:r>
+              <a:rPr lang="en-US" dirty="0" smtClean="0"/>
+              <a:t>width</a:t>
+            </a:r>
+            <a:endParaRPr lang="ru-RU" dirty="0"/>
+          </a:p>
+        </p:txBody>
+      </p:sp>
+      <p:sp>
+        <p:nvSpPr>
+          <p:cNvPr id="3" name="Объект 2"/>
+          <p:cNvSpPr>
+            <a:spLocks noGrp="1"/>
+          </p:cNvSpPr>
+          <p:nvPr>
+            <p:ph idx="1"/>
+          </p:nvPr>
+        </p:nvSpPr>
+        <p:spPr/>
+        <p:txBody>
+          <a:bodyPr/>
+          <a:lstStyle/>
+          <a:p>
+            <a:r>
+              <a:rPr lang="ru-RU" dirty="0" smtClean="0"/>
+              <a:t>Ширина элемента. Не работает на строчных элементах.</a:t>
+            </a:r>
+          </a:p>
+          <a:p>
+            <a:endParaRPr lang="ru-RU" dirty="0"/>
+          </a:p>
+          <a:p>
+            <a:r>
+              <a:rPr lang="en-US" dirty="0" smtClean="0"/>
+              <a:t>width: 100px;		width: 50%;</a:t>
+            </a:r>
+          </a:p>
+          <a:p>
+            <a:r>
+              <a:rPr lang="en-US" dirty="0" smtClean="0"/>
+              <a:t>width: auto;</a:t>
+            </a:r>
+          </a:p>
+          <a:p>
+            <a:endParaRPr lang="en-US" dirty="0"/>
+          </a:p>
+          <a:p>
+            <a:r>
+              <a:rPr lang="en-US" dirty="0">
+                <a:hlinkClick r:id="rId2"/>
+              </a:rPr>
+              <a:t>https://developer.mozilla.org/ru/docs/Web/CSS/width</a:t>
+            </a:r>
+            <a:r>
+              <a:rPr lang="en-US" dirty="0" smtClean="0"/>
+              <a:t>		</a:t>
+            </a:r>
+            <a:endParaRPr lang="ru-RU" dirty="0"/>
+          </a:p>
+        </p:txBody>
+      </p:sp>
+    </p:spTree>
+    <p:extLst>
+      <p:ext uri="{BB962C8B-B14F-4D97-AF65-F5344CB8AC3E}">
+        <p14:creationId xmlns:p14="http://schemas.microsoft.com/office/powerpoint/2010/main" val="1247075987"/>
+      </p:ext>
+    </p:extLst>
+  </p:cSld>
+  <p:clrMapOvr>
+    <a:masterClrMapping/>
+  </p:clrMapOvr>
+</p:sld>
+</file>
+
+<file path=ppt/slides/slide21.xml><?xml version="1.0" encoding="utf-8"?>
+<p:sld xmlns:a="http://schemas.openxmlformats.org/drawingml/2006/main" xmlns:r="http://schemas.openxmlformats.org/officeDocument/2006/relationships" xmlns:p="http://schemas.openxmlformats.org/presentationml/2006/main">
+  <p:cSld>
+    <p:bg>
+      <p:bgPr>
+        <a:solidFill>
+          <a:srgbClr val="8BC34A"/>
+        </a:solidFill>
+        <a:effectLst/>
+      </p:bgPr>
+    </p:bg>
+    <p:spTree>
+      <p:nvGrpSpPr>
+        <p:cNvPr id="1" name=""/>
+        <p:cNvGrpSpPr/>
+        <p:nvPr/>
+      </p:nvGrpSpPr>
+      <p:grpSpPr>
+        <a:xfrm>
+          <a:off x="0" y="0"/>
+          <a:ext cx="0" cy="0"/>
+          <a:chOff x="0" y="0"/>
+          <a:chExt cx="0" cy="0"/>
+        </a:xfrm>
+      </p:grpSpPr>
+      <p:sp>
+        <p:nvSpPr>
+          <p:cNvPr id="2" name="Заголовок 1"/>
+          <p:cNvSpPr>
+            <a:spLocks noGrp="1"/>
+          </p:cNvSpPr>
+          <p:nvPr>
+            <p:ph type="title"/>
+          </p:nvPr>
+        </p:nvSpPr>
+        <p:spPr/>
+        <p:txBody>
+          <a:bodyPr/>
+          <a:lstStyle/>
+          <a:p>
+            <a:r>
+              <a:rPr lang="en-US" dirty="0" smtClean="0"/>
+              <a:t>height</a:t>
+            </a:r>
+            <a:endParaRPr lang="ru-RU" dirty="0"/>
+          </a:p>
+        </p:txBody>
+      </p:sp>
+      <p:sp>
+        <p:nvSpPr>
+          <p:cNvPr id="3" name="Объект 2"/>
+          <p:cNvSpPr>
+            <a:spLocks noGrp="1"/>
+          </p:cNvSpPr>
+          <p:nvPr>
+            <p:ph idx="1"/>
+          </p:nvPr>
+        </p:nvSpPr>
+        <p:spPr/>
+        <p:txBody>
+          <a:bodyPr>
+            <a:normAutofit lnSpcReduction="10000"/>
+          </a:bodyPr>
+          <a:lstStyle/>
+          <a:p>
+            <a:r>
+              <a:rPr lang="ru-RU" dirty="0" smtClean="0"/>
+              <a:t>Высота элемента</a:t>
+            </a:r>
+          </a:p>
+          <a:p>
+            <a:r>
+              <a:rPr lang="en-US" dirty="0" smtClean="0"/>
+              <a:t>height</a:t>
+            </a:r>
+            <a:r>
+              <a:rPr lang="en-US" dirty="0"/>
+              <a:t>: 150px;</a:t>
+            </a:r>
+          </a:p>
+          <a:p>
+            <a:r>
+              <a:rPr lang="en-US" dirty="0"/>
+              <a:t>height: 6em;</a:t>
+            </a:r>
+          </a:p>
+          <a:p>
+            <a:r>
+              <a:rPr lang="en-US" dirty="0"/>
+              <a:t>height: 75%;</a:t>
+            </a:r>
+          </a:p>
+          <a:p>
+            <a:r>
+              <a:rPr lang="en-US" dirty="0"/>
+              <a:t>height: auto</a:t>
+            </a:r>
+            <a:r>
+              <a:rPr lang="en-US" dirty="0" smtClean="0"/>
+              <a:t>;</a:t>
+            </a:r>
+            <a:endParaRPr lang="ru-RU" dirty="0" smtClean="0"/>
+          </a:p>
+          <a:p>
+            <a:endParaRPr lang="ru-RU" dirty="0"/>
+          </a:p>
+          <a:p>
+            <a:r>
+              <a:rPr lang="en-US" dirty="0">
+                <a:hlinkClick r:id="rId2"/>
+              </a:rPr>
+              <a:t>https://developer.mozilla.org/ru/docs/Web/CSS/height</a:t>
+            </a:r>
+            <a:endParaRPr lang="ru-RU" dirty="0"/>
+          </a:p>
+        </p:txBody>
+      </p:sp>
+    </p:spTree>
+    <p:extLst>
+      <p:ext uri="{BB962C8B-B14F-4D97-AF65-F5344CB8AC3E}">
+        <p14:creationId xmlns:p14="http://schemas.microsoft.com/office/powerpoint/2010/main" val="4099142312"/>
+      </p:ext>
+    </p:extLst>
+  </p:cSld>
+  <p:clrMapOvr>
+    <a:masterClrMapping/>
+  </p:clrMapOvr>
+</p:sld>
+</file>
+
+<file path=ppt/slides/slide22.xml><?xml version="1.0" encoding="utf-8"?>
+<p:sld xmlns:a="http://schemas.openxmlformats.org/drawingml/2006/main" xmlns:r="http://schemas.openxmlformats.org/officeDocument/2006/relationships" xmlns:p="http://schemas.openxmlformats.org/presentationml/2006/main">
+  <p:cSld>
+    <p:bg>
+      <p:bgPr>
+        <a:solidFill>
+          <a:srgbClr val="8BC34A"/>
+        </a:solidFill>
+        <a:effectLst/>
+      </p:bgPr>
+    </p:bg>
+    <p:spTree>
+      <p:nvGrpSpPr>
+        <p:cNvPr id="1" name=""/>
+        <p:cNvGrpSpPr/>
+        <p:nvPr/>
+      </p:nvGrpSpPr>
+      <p:grpSpPr>
+        <a:xfrm>
+          <a:off x="0" y="0"/>
+          <a:ext cx="0" cy="0"/>
+          <a:chOff x="0" y="0"/>
+          <a:chExt cx="0" cy="0"/>
+        </a:xfrm>
+      </p:grpSpPr>
+      <p:sp>
+        <p:nvSpPr>
+          <p:cNvPr id="2" name="Заголовок 1"/>
+          <p:cNvSpPr>
+            <a:spLocks noGrp="1"/>
+          </p:cNvSpPr>
+          <p:nvPr>
+            <p:ph type="title"/>
+          </p:nvPr>
+        </p:nvSpPr>
+        <p:spPr/>
+        <p:txBody>
+          <a:bodyPr/>
+          <a:lstStyle/>
+          <a:p>
+            <a:r>
+              <a:rPr lang="en-US" dirty="0" smtClean="0"/>
+              <a:t>margin</a:t>
+            </a:r>
+            <a:endParaRPr lang="ru-RU" dirty="0"/>
+          </a:p>
+        </p:txBody>
+      </p:sp>
+      <p:sp>
+        <p:nvSpPr>
+          <p:cNvPr id="3" name="Объект 2"/>
+          <p:cNvSpPr>
+            <a:spLocks noGrp="1"/>
+          </p:cNvSpPr>
+          <p:nvPr>
+            <p:ph idx="1"/>
+          </p:nvPr>
+        </p:nvSpPr>
+        <p:spPr/>
+        <p:txBody>
+          <a:bodyPr>
+            <a:normAutofit fontScale="55000" lnSpcReduction="20000"/>
+          </a:bodyPr>
+          <a:lstStyle/>
+          <a:p>
+            <a:r>
+              <a:rPr lang="ru-RU" dirty="0" smtClean="0"/>
+              <a:t>Внешний </a:t>
+            </a:r>
+            <a:r>
+              <a:rPr lang="ru-RU" dirty="0"/>
+              <a:t>отступ на всех четырех сторонах элемента.</a:t>
+            </a:r>
+            <a:endParaRPr lang="ru-RU" dirty="0" smtClean="0"/>
+          </a:p>
+          <a:p>
+            <a:endParaRPr lang="ru-RU" dirty="0"/>
+          </a:p>
+          <a:p>
+            <a:r>
+              <a:rPr lang="ru-RU" dirty="0" smtClean="0"/>
+              <a:t>/* </a:t>
+            </a:r>
+            <a:r>
+              <a:rPr lang="ru-RU" dirty="0"/>
+              <a:t>Применяется ко всем четырём сторонам */</a:t>
+            </a:r>
+          </a:p>
+          <a:p>
+            <a:r>
+              <a:rPr lang="en-US" dirty="0"/>
+              <a:t>margin: 1em;</a:t>
+            </a:r>
+          </a:p>
+          <a:p>
+            <a:endParaRPr lang="en-US" dirty="0"/>
+          </a:p>
+          <a:p>
+            <a:r>
+              <a:rPr lang="en-US" dirty="0"/>
+              <a:t>/* </a:t>
+            </a:r>
+            <a:r>
+              <a:rPr lang="ru-RU" dirty="0"/>
+              <a:t>по вертикали | по горизонтали */</a:t>
+            </a:r>
+          </a:p>
+          <a:p>
+            <a:r>
+              <a:rPr lang="en-US" dirty="0"/>
+              <a:t>margin: 5% auto</a:t>
+            </a:r>
+            <a:r>
+              <a:rPr lang="en-US" dirty="0" smtClean="0"/>
+              <a:t>;</a:t>
+            </a:r>
+          </a:p>
+          <a:p>
+            <a:r>
+              <a:rPr lang="en-US" dirty="0" smtClean="0"/>
+              <a:t>margin: 0 auto; - </a:t>
+            </a:r>
+            <a:r>
+              <a:rPr lang="ru-RU" dirty="0" smtClean="0"/>
+              <a:t>центровка элемента по горизонтали</a:t>
+            </a:r>
+            <a:endParaRPr lang="en-US" dirty="0"/>
+          </a:p>
+          <a:p>
+            <a:endParaRPr lang="en-US" dirty="0"/>
+          </a:p>
+          <a:p>
+            <a:r>
+              <a:rPr lang="en-US" dirty="0"/>
+              <a:t>/* </a:t>
+            </a:r>
+            <a:r>
+              <a:rPr lang="ru-RU" dirty="0"/>
+              <a:t>сверху | горизонтально | снизу */</a:t>
+            </a:r>
+          </a:p>
+          <a:p>
+            <a:r>
+              <a:rPr lang="en-US" dirty="0"/>
+              <a:t>margin: 1em auto 2em; </a:t>
+            </a:r>
+          </a:p>
+          <a:p>
+            <a:endParaRPr lang="en-US" dirty="0"/>
+          </a:p>
+          <a:p>
+            <a:r>
+              <a:rPr lang="en-US" dirty="0"/>
+              <a:t>/* </a:t>
+            </a:r>
+            <a:r>
+              <a:rPr lang="ru-RU" dirty="0"/>
+              <a:t>сверху | справа | снизу | слева */</a:t>
+            </a:r>
+          </a:p>
+          <a:p>
+            <a:r>
+              <a:rPr lang="en-US" dirty="0"/>
+              <a:t>margin: 2px 1em 0 auto</a:t>
+            </a:r>
+            <a:r>
+              <a:rPr lang="en-US" dirty="0" smtClean="0"/>
+              <a:t>;</a:t>
+            </a:r>
+            <a:endParaRPr lang="ru-RU" dirty="0" smtClean="0"/>
+          </a:p>
+          <a:p>
+            <a:endParaRPr lang="ru-RU" dirty="0"/>
+          </a:p>
+          <a:p>
+            <a:r>
+              <a:rPr lang="en-US" dirty="0">
+                <a:hlinkClick r:id="rId2"/>
+              </a:rPr>
+              <a:t>https://developer.mozilla.org/ru/docs/Web/CSS/margin</a:t>
+            </a:r>
+            <a:endParaRPr lang="ru-RU" dirty="0"/>
+          </a:p>
+        </p:txBody>
+      </p:sp>
+    </p:spTree>
+    <p:extLst>
+      <p:ext uri="{BB962C8B-B14F-4D97-AF65-F5344CB8AC3E}">
+        <p14:creationId xmlns:p14="http://schemas.microsoft.com/office/powerpoint/2010/main" val="523663315"/>
+      </p:ext>
+    </p:extLst>
+  </p:cSld>
+  <p:clrMapOvr>
+    <a:masterClrMapping/>
+  </p:clrMapOvr>
+</p:sld>
+</file>
+
+<file path=ppt/slides/slide23.xml><?xml version="1.0" encoding="utf-8"?>
+<p:sld xmlns:a="http://schemas.openxmlformats.org/drawingml/2006/main" xmlns:r="http://schemas.openxmlformats.org/officeDocument/2006/relationships" xmlns:p="http://schemas.openxmlformats.org/presentationml/2006/main">
+  <p:cSld>
+    <p:bg>
+      <p:bgPr>
+        <a:solidFill>
+          <a:srgbClr val="8BC34A"/>
+        </a:solidFill>
+        <a:effectLst/>
+      </p:bgPr>
+    </p:bg>
+    <p:spTree>
+      <p:nvGrpSpPr>
+        <p:cNvPr id="1" name=""/>
+        <p:cNvGrpSpPr/>
+        <p:nvPr/>
+      </p:nvGrpSpPr>
+      <p:grpSpPr>
+        <a:xfrm>
+          <a:off x="0" y="0"/>
+          <a:ext cx="0" cy="0"/>
+          <a:chOff x="0" y="0"/>
+          <a:chExt cx="0" cy="0"/>
+        </a:xfrm>
+      </p:grpSpPr>
+      <p:sp>
+        <p:nvSpPr>
+          <p:cNvPr id="2" name="Заголовок 1"/>
+          <p:cNvSpPr>
+            <a:spLocks noGrp="1"/>
+          </p:cNvSpPr>
+          <p:nvPr>
+            <p:ph type="title"/>
+          </p:nvPr>
+        </p:nvSpPr>
+        <p:spPr/>
+        <p:txBody>
+          <a:bodyPr/>
+          <a:lstStyle/>
+          <a:p>
+            <a:r>
+              <a:rPr lang="en-US" dirty="0" smtClean="0"/>
+              <a:t>padding</a:t>
+            </a:r>
+            <a:endParaRPr lang="ru-RU" dirty="0"/>
+          </a:p>
+        </p:txBody>
+      </p:sp>
+      <p:sp>
+        <p:nvSpPr>
+          <p:cNvPr id="3" name="Объект 2"/>
+          <p:cNvSpPr>
+            <a:spLocks noGrp="1"/>
+          </p:cNvSpPr>
+          <p:nvPr>
+            <p:ph idx="1"/>
+          </p:nvPr>
+        </p:nvSpPr>
+        <p:spPr/>
+        <p:txBody>
+          <a:bodyPr>
+            <a:normAutofit fontScale="55000" lnSpcReduction="20000"/>
+          </a:bodyPr>
+          <a:lstStyle/>
+          <a:p>
+            <a:r>
+              <a:rPr lang="ru-RU" dirty="0"/>
+              <a:t>В</a:t>
+            </a:r>
+            <a:r>
+              <a:rPr lang="ru-RU" dirty="0" smtClean="0"/>
+              <a:t>нутренние</a:t>
+            </a:r>
+            <a:r>
+              <a:rPr lang="ru-RU" dirty="0"/>
+              <a:t> отступы/поля со всех сторон элемента</a:t>
+            </a:r>
+            <a:r>
+              <a:rPr lang="ru-RU" dirty="0" smtClean="0"/>
+              <a:t>.</a:t>
+            </a:r>
+          </a:p>
+          <a:p>
+            <a:endParaRPr lang="ru-RU" dirty="0"/>
+          </a:p>
+          <a:p>
+            <a:r>
+              <a:rPr lang="ru-RU" dirty="0"/>
+              <a:t>/* Применяется для всех 4 сторон */</a:t>
+            </a:r>
+          </a:p>
+          <a:p>
+            <a:r>
+              <a:rPr lang="en-US" dirty="0"/>
+              <a:t>padding: 1em;</a:t>
+            </a:r>
+          </a:p>
+          <a:p>
+            <a:endParaRPr lang="en-US" dirty="0"/>
+          </a:p>
+          <a:p>
+            <a:r>
+              <a:rPr lang="en-US" dirty="0"/>
+              <a:t>/* </a:t>
+            </a:r>
+            <a:r>
+              <a:rPr lang="ru-RU" dirty="0"/>
+              <a:t>По вертикали | По горизонтали */</a:t>
+            </a:r>
+          </a:p>
+          <a:p>
+            <a:r>
+              <a:rPr lang="en-US" dirty="0"/>
+              <a:t>padding: 5% 10%;</a:t>
+            </a:r>
+          </a:p>
+          <a:p>
+            <a:endParaRPr lang="en-US" dirty="0"/>
+          </a:p>
+          <a:p>
+            <a:r>
+              <a:rPr lang="en-US" dirty="0"/>
+              <a:t>/* </a:t>
+            </a:r>
+            <a:r>
+              <a:rPr lang="ru-RU" dirty="0"/>
+              <a:t>Сверху | По горизонтали | Снизу */</a:t>
+            </a:r>
+          </a:p>
+          <a:p>
+            <a:r>
+              <a:rPr lang="en-US" dirty="0"/>
+              <a:t>padding: 1em 2em </a:t>
+            </a:r>
+            <a:r>
+              <a:rPr lang="en-US" dirty="0" err="1"/>
+              <a:t>2em</a:t>
+            </a:r>
+            <a:r>
+              <a:rPr lang="en-US" dirty="0"/>
+              <a:t>; </a:t>
+            </a:r>
+          </a:p>
+          <a:p>
+            <a:endParaRPr lang="en-US" dirty="0"/>
+          </a:p>
+          <a:p>
+            <a:r>
+              <a:rPr lang="en-US" dirty="0"/>
+              <a:t>/* </a:t>
+            </a:r>
+            <a:r>
+              <a:rPr lang="ru-RU" dirty="0"/>
+              <a:t>Сверху | Справа | Снизу | Слева */</a:t>
+            </a:r>
+          </a:p>
+          <a:p>
+            <a:r>
+              <a:rPr lang="en-US" dirty="0"/>
+              <a:t>padding: 2px 1em 0 1em</a:t>
+            </a:r>
+            <a:r>
+              <a:rPr lang="en-US" dirty="0" smtClean="0"/>
+              <a:t>;</a:t>
+            </a:r>
+            <a:endParaRPr lang="ru-RU" dirty="0" smtClean="0"/>
+          </a:p>
+          <a:p>
+            <a:endParaRPr lang="ru-RU" dirty="0"/>
+          </a:p>
+          <a:p>
+            <a:r>
+              <a:rPr lang="en-US" dirty="0">
+                <a:hlinkClick r:id="rId2"/>
+              </a:rPr>
+              <a:t>https://developer.mozilla.org/ru/docs/Web/CSS/padding</a:t>
+            </a:r>
+            <a:endParaRPr lang="ru-RU" dirty="0"/>
+          </a:p>
+        </p:txBody>
+      </p:sp>
+    </p:spTree>
+    <p:extLst>
+      <p:ext uri="{BB962C8B-B14F-4D97-AF65-F5344CB8AC3E}">
+        <p14:creationId xmlns:p14="http://schemas.microsoft.com/office/powerpoint/2010/main" val="743330850"/>
+      </p:ext>
+    </p:extLst>
+  </p:cSld>
+  <p:clrMapOvr>
+    <a:masterClrMapping/>
+  </p:clrMapOvr>
 </p:sld>
 </file>
 

</xml_diff>

<commit_message>
add materials for lesson 2
</commit_message>
<xml_diff>
--- a/00-presentation/Frontend 102.pptx
+++ b/00-presentation/Frontend 102.pptx
@@ -5,7 +5,7 @@
     <p:sldMasterId id="2147483648" r:id="rId1"/>
   </p:sldMasterIdLst>
   <p:notesMasterIdLst>
-    <p:notesMasterId r:id="rId25"/>
+    <p:notesMasterId r:id="rId33"/>
   </p:notesMasterIdLst>
   <p:sldIdLst>
     <p:sldId id="256" r:id="rId2"/>
@@ -31,6 +31,14 @@
     <p:sldId id="276" r:id="rId22"/>
     <p:sldId id="277" r:id="rId23"/>
     <p:sldId id="278" r:id="rId24"/>
+    <p:sldId id="279" r:id="rId25"/>
+    <p:sldId id="280" r:id="rId26"/>
+    <p:sldId id="281" r:id="rId27"/>
+    <p:sldId id="282" r:id="rId28"/>
+    <p:sldId id="283" r:id="rId29"/>
+    <p:sldId id="284" r:id="rId30"/>
+    <p:sldId id="285" r:id="rId31"/>
+    <p:sldId id="286" r:id="rId32"/>
   </p:sldIdLst>
   <p:sldSz cx="9144000" cy="6858000" type="screen4x3"/>
   <p:notesSz cx="6858000" cy="9144000"/>
@@ -157,12 +165,20 @@
             <p14:sldId id="276"/>
             <p14:sldId id="277"/>
             <p14:sldId id="278"/>
+            <p14:sldId id="279"/>
+            <p14:sldId id="280"/>
+            <p14:sldId id="281"/>
+            <p14:sldId id="282"/>
+            <p14:sldId id="283"/>
+            <p14:sldId id="284"/>
+            <p14:sldId id="285"/>
+            <p14:sldId id="286"/>
           </p14:sldIdLst>
         </p14:section>
       </p14:sectionLst>
     </p:ext>
     <p:ext uri="{EFAFB233-063F-42B5-8137-9DF3F51BA10A}">
-      <p15:sldGuideLst xmlns:p15="http://schemas.microsoft.com/office/powerpoint/2012/main">
+      <p15:sldGuideLst xmlns:p15="http://schemas.microsoft.com/office/powerpoint/2012/main" xmlns="">
         <p15:guide id="1" orient="horz" pos="2160">
           <p15:clr>
             <a:srgbClr val="A4A3A4"/>
@@ -261,7 +277,7 @@
           <a:p>
             <a:fld id="{FE6E0087-205E-475D-B9F7-441EAED58169}" type="datetimeFigureOut">
               <a:rPr lang="ru-RU" smtClean="0"/>
-              <a:t>14.10.2019</a:t>
+              <a:t>15.10.2019</a:t>
             </a:fld>
             <a:endParaRPr lang="ru-RU"/>
           </a:p>
@@ -710,7 +726,7 @@
           <a:p>
             <a:fld id="{0D602453-4147-4C7A-BDB0-0580C07D47BF}" type="datetimeFigureOut">
               <a:rPr lang="ru-RU" smtClean="0"/>
-              <a:t>14.10.2019</a:t>
+              <a:t>15.10.2019</a:t>
             </a:fld>
             <a:endParaRPr lang="ru-RU"/>
           </a:p>
@@ -880,7 +896,7 @@
           <a:p>
             <a:fld id="{0D602453-4147-4C7A-BDB0-0580C07D47BF}" type="datetimeFigureOut">
               <a:rPr lang="ru-RU" smtClean="0"/>
-              <a:t>14.10.2019</a:t>
+              <a:t>15.10.2019</a:t>
             </a:fld>
             <a:endParaRPr lang="ru-RU"/>
           </a:p>
@@ -1060,7 +1076,7 @@
           <a:p>
             <a:fld id="{0D602453-4147-4C7A-BDB0-0580C07D47BF}" type="datetimeFigureOut">
               <a:rPr lang="ru-RU" smtClean="0"/>
-              <a:t>14.10.2019</a:t>
+              <a:t>15.10.2019</a:t>
             </a:fld>
             <a:endParaRPr lang="ru-RU"/>
           </a:p>
@@ -1230,7 +1246,7 @@
           <a:p>
             <a:fld id="{0D602453-4147-4C7A-BDB0-0580C07D47BF}" type="datetimeFigureOut">
               <a:rPr lang="ru-RU" smtClean="0"/>
-              <a:t>14.10.2019</a:t>
+              <a:t>15.10.2019</a:t>
             </a:fld>
             <a:endParaRPr lang="ru-RU"/>
           </a:p>
@@ -1476,7 +1492,7 @@
           <a:p>
             <a:fld id="{0D602453-4147-4C7A-BDB0-0580C07D47BF}" type="datetimeFigureOut">
               <a:rPr lang="ru-RU" smtClean="0"/>
-              <a:t>14.10.2019</a:t>
+              <a:t>15.10.2019</a:t>
             </a:fld>
             <a:endParaRPr lang="ru-RU"/>
           </a:p>
@@ -1764,7 +1780,7 @@
           <a:p>
             <a:fld id="{0D602453-4147-4C7A-BDB0-0580C07D47BF}" type="datetimeFigureOut">
               <a:rPr lang="ru-RU" smtClean="0"/>
-              <a:t>14.10.2019</a:t>
+              <a:t>15.10.2019</a:t>
             </a:fld>
             <a:endParaRPr lang="ru-RU"/>
           </a:p>
@@ -2186,7 +2202,7 @@
           <a:p>
             <a:fld id="{0D602453-4147-4C7A-BDB0-0580C07D47BF}" type="datetimeFigureOut">
               <a:rPr lang="ru-RU" smtClean="0"/>
-              <a:t>14.10.2019</a:t>
+              <a:t>15.10.2019</a:t>
             </a:fld>
             <a:endParaRPr lang="ru-RU"/>
           </a:p>
@@ -2304,7 +2320,7 @@
           <a:p>
             <a:fld id="{0D602453-4147-4C7A-BDB0-0580C07D47BF}" type="datetimeFigureOut">
               <a:rPr lang="ru-RU" smtClean="0"/>
-              <a:t>14.10.2019</a:t>
+              <a:t>15.10.2019</a:t>
             </a:fld>
             <a:endParaRPr lang="ru-RU"/>
           </a:p>
@@ -2399,7 +2415,7 @@
           <a:p>
             <a:fld id="{0D602453-4147-4C7A-BDB0-0580C07D47BF}" type="datetimeFigureOut">
               <a:rPr lang="ru-RU" smtClean="0"/>
-              <a:t>14.10.2019</a:t>
+              <a:t>15.10.2019</a:t>
             </a:fld>
             <a:endParaRPr lang="ru-RU"/>
           </a:p>
@@ -2676,7 +2692,7 @@
           <a:p>
             <a:fld id="{0D602453-4147-4C7A-BDB0-0580C07D47BF}" type="datetimeFigureOut">
               <a:rPr lang="ru-RU" smtClean="0"/>
-              <a:t>14.10.2019</a:t>
+              <a:t>15.10.2019</a:t>
             </a:fld>
             <a:endParaRPr lang="ru-RU"/>
           </a:p>
@@ -2929,7 +2945,7 @@
           <a:p>
             <a:fld id="{0D602453-4147-4C7A-BDB0-0580C07D47BF}" type="datetimeFigureOut">
               <a:rPr lang="ru-RU" smtClean="0"/>
-              <a:t>14.10.2019</a:t>
+              <a:t>15.10.2019</a:t>
             </a:fld>
             <a:endParaRPr lang="ru-RU"/>
           </a:p>
@@ -3142,7 +3158,7 @@
           <a:p>
             <a:fld id="{0D602453-4147-4C7A-BDB0-0580C07D47BF}" type="datetimeFigureOut">
               <a:rPr lang="ru-RU" smtClean="0"/>
-              <a:t>14.10.2019</a:t>
+              <a:t>15.10.2019</a:t>
             </a:fld>
             <a:endParaRPr lang="ru-RU"/>
           </a:p>
@@ -4868,24 +4884,57 @@
           <a:bodyPr/>
           <a:lstStyle/>
           <a:p>
-            <a:r>
-              <a:rPr lang="ru-RU" dirty="0" smtClean="0"/>
+            <a:pPr marL="0" indent="0">
+              <a:buNone/>
+            </a:pPr>
+            <a:r>
+              <a:rPr lang="ru-RU" dirty="0" smtClean="0">
+                <a:solidFill>
+                  <a:schemeClr val="bg1">
+                    <a:lumMod val="95000"/>
+                  </a:schemeClr>
+                </a:solidFill>
+              </a:rPr>
               <a:t>Свойство </a:t>
             </a:r>
             <a:r>
-              <a:rPr lang="en-US" dirty="0" smtClean="0"/>
+              <a:rPr lang="en-US" dirty="0" smtClean="0">
+                <a:solidFill>
+                  <a:schemeClr val="bg1">
+                    <a:lumMod val="95000"/>
+                  </a:schemeClr>
+                </a:solidFill>
+              </a:rPr>
               <a:t>display </a:t>
             </a:r>
             <a:r>
-              <a:rPr lang="ru-RU" dirty="0" smtClean="0"/>
+              <a:rPr lang="ru-RU" dirty="0" smtClean="0">
+                <a:solidFill>
+                  <a:schemeClr val="bg1">
+                    <a:lumMod val="95000"/>
+                  </a:schemeClr>
+                </a:solidFill>
+              </a:rPr>
               <a:t>управляет типом элемента.</a:t>
             </a:r>
-            <a:endParaRPr lang="en-US" dirty="0" smtClean="0"/>
-          </a:p>
-          <a:p>
+            <a:endParaRPr lang="en-US" dirty="0" smtClean="0">
+              <a:solidFill>
+                <a:schemeClr val="bg1">
+                  <a:lumMod val="95000"/>
+                </a:schemeClr>
+              </a:solidFill>
+            </a:endParaRPr>
+          </a:p>
+          <a:p>
+            <a:pPr marL="0" indent="0">
+              <a:buNone/>
+            </a:pPr>
             <a:endParaRPr lang="ru-RU" dirty="0" smtClean="0"/>
           </a:p>
           <a:p>
+            <a:pPr marL="0" indent="0">
+              <a:buNone/>
+            </a:pPr>
             <a:r>
               <a:rPr lang="en-US" dirty="0"/>
               <a:t>d</a:t>
@@ -4916,6 +4965,9 @@
             </a:r>
           </a:p>
           <a:p>
+            <a:pPr marL="0" indent="0">
+              <a:buNone/>
+            </a:pPr>
             <a:r>
               <a:rPr lang="en-US" dirty="0" smtClean="0"/>
               <a:t>display: inline; </a:t>
@@ -4949,6 +5001,9 @@
             </a:endParaRPr>
           </a:p>
           <a:p>
+            <a:pPr marL="0" indent="0">
+              <a:buNone/>
+            </a:pPr>
             <a:r>
               <a:rPr lang="en-US" dirty="0" smtClean="0"/>
               <a:t>display: inline-block; </a:t>
@@ -4975,6 +5030,9 @@
             </a:r>
           </a:p>
           <a:p>
+            <a:pPr marL="0" indent="0">
+              <a:buNone/>
+            </a:pPr>
             <a:r>
               <a:rPr lang="en-US" dirty="0" smtClean="0"/>
               <a:t>display: flex; </a:t>
@@ -5103,7 +5161,24 @@
                   </a:outerShdw>
                 </a:effectLst>
               </a:rPr>
-              <a:t>Основы </a:t>
+              <a:t>Введение в</a:t>
+            </a:r>
+            <a:r>
+              <a:rPr lang="ru-RU" dirty="0" smtClean="0">
+                <a:solidFill>
+                  <a:schemeClr val="bg1">
+                    <a:lumMod val="95000"/>
+                  </a:schemeClr>
+                </a:solidFill>
+                <a:effectLst>
+                  <a:outerShdw blurRad="38100" dist="38100" dir="2700000" algn="tl">
+                    <a:srgbClr val="000000">
+                      <a:alpha val="43137"/>
+                    </a:srgbClr>
+                  </a:outerShdw>
+                </a:effectLst>
+              </a:rPr>
+              <a:t> </a:t>
             </a:r>
             <a:r>
               <a:rPr lang="en-US" dirty="0" smtClean="0">
@@ -5319,7 +5394,7 @@
         <p:spPr>
           <a:xfrm>
             <a:off x="179510" y="6477559"/>
-            <a:ext cx="2316660" cy="261610"/>
+            <a:ext cx="2183611" cy="261610"/>
           </a:xfrm>
           <a:prstGeom prst="rect">
             <a:avLst/>
@@ -5351,7 +5426,7 @@
             </a:r>
             <a:r>
               <a:rPr lang="ru-RU" sz="1100" dirty="0" smtClean="0"/>
-              <a:t>101</a:t>
+              <a:t>102</a:t>
             </a:r>
             <a:r>
               <a:rPr lang="en-US" sz="1100" dirty="0" smtClean="0"/>
@@ -5371,7 +5446,7 @@
             </a:r>
             <a:r>
               <a:rPr lang="en-US" sz="1100" dirty="0" smtClean="0"/>
-              <a:t>HTML</a:t>
+              <a:t>CSS</a:t>
             </a:r>
             <a:endParaRPr lang="ru-RU" sz="1100" dirty="0"/>
           </a:p>
@@ -5460,30 +5535,54 @@
           <a:bodyPr/>
           <a:lstStyle/>
           <a:p>
-            <a:r>
-              <a:rPr lang="ru-RU" dirty="0" smtClean="0"/>
+            <a:pPr marL="0" indent="0">
+              <a:buNone/>
+            </a:pPr>
+            <a:r>
+              <a:rPr lang="ru-RU" dirty="0" smtClean="0">
+                <a:solidFill>
+                  <a:schemeClr val="bg1">
+                    <a:lumMod val="95000"/>
+                  </a:schemeClr>
+                </a:solidFill>
+              </a:rPr>
               <a:t>Ширина элемента. Не работает на строчных элементах.</a:t>
             </a:r>
           </a:p>
           <a:p>
+            <a:pPr marL="0" indent="0">
+              <a:buNone/>
+            </a:pPr>
             <a:endParaRPr lang="ru-RU" dirty="0"/>
           </a:p>
           <a:p>
+            <a:pPr marL="0" indent="0">
+              <a:buNone/>
+            </a:pPr>
             <a:r>
               <a:rPr lang="en-US" dirty="0" smtClean="0"/>
               <a:t>width: 100px;		width: 50%;</a:t>
             </a:r>
           </a:p>
           <a:p>
+            <a:pPr marL="0" indent="0">
+              <a:buNone/>
+            </a:pPr>
             <a:r>
               <a:rPr lang="en-US" dirty="0" smtClean="0"/>
               <a:t>width: auto;</a:t>
             </a:r>
           </a:p>
           <a:p>
+            <a:pPr marL="0" indent="0">
+              <a:buNone/>
+            </a:pPr>
             <a:endParaRPr lang="en-US" dirty="0"/>
           </a:p>
           <a:p>
+            <a:pPr marL="0" indent="0">
+              <a:buNone/>
+            </a:pPr>
             <a:r>
               <a:rPr lang="en-US" dirty="0">
                 <a:hlinkClick r:id="rId2"/>
@@ -5576,12 +5675,24 @@
           </a:bodyPr>
           <a:lstStyle/>
           <a:p>
-            <a:r>
-              <a:rPr lang="ru-RU" dirty="0" smtClean="0"/>
+            <a:pPr marL="0" indent="0">
+              <a:buNone/>
+            </a:pPr>
+            <a:r>
+              <a:rPr lang="ru-RU" dirty="0" smtClean="0">
+                <a:solidFill>
+                  <a:schemeClr val="bg1">
+                    <a:lumMod val="95000"/>
+                  </a:schemeClr>
+                </a:solidFill>
+              </a:rPr>
               <a:t>Высота элемента</a:t>
             </a:r>
           </a:p>
           <a:p>
+            <a:pPr marL="0" indent="0">
+              <a:buNone/>
+            </a:pPr>
             <a:r>
               <a:rPr lang="en-US" dirty="0" smtClean="0"/>
               <a:t>height</a:t>
@@ -5592,18 +5703,27 @@
             </a:r>
           </a:p>
           <a:p>
+            <a:pPr marL="0" indent="0">
+              <a:buNone/>
+            </a:pPr>
             <a:r>
               <a:rPr lang="en-US" dirty="0"/>
               <a:t>height: 6em;</a:t>
             </a:r>
           </a:p>
           <a:p>
+            <a:pPr marL="0" indent="0">
+              <a:buNone/>
+            </a:pPr>
             <a:r>
               <a:rPr lang="en-US" dirty="0"/>
               <a:t>height: 75%;</a:t>
             </a:r>
           </a:p>
           <a:p>
+            <a:pPr marL="0" indent="0">
+              <a:buNone/>
+            </a:pPr>
             <a:r>
               <a:rPr lang="en-US" dirty="0"/>
               <a:t>height: auto</a:t>
@@ -5615,9 +5735,15 @@
             <a:endParaRPr lang="ru-RU" dirty="0" smtClean="0"/>
           </a:p>
           <a:p>
+            <a:pPr marL="0" indent="0">
+              <a:buNone/>
+            </a:pPr>
             <a:endParaRPr lang="ru-RU" dirty="0"/>
           </a:p>
           <a:p>
+            <a:pPr marL="0" indent="0">
+              <a:buNone/>
+            </a:pPr>
             <a:r>
               <a:rPr lang="en-US" dirty="0">
                 <a:hlinkClick r:id="rId2"/>
@@ -5702,126 +5828,250 @@
         <p:spPr/>
         <p:txBody>
           <a:bodyPr>
-            <a:normAutofit fontScale="55000" lnSpcReduction="20000"/>
+            <a:normAutofit fontScale="47500" lnSpcReduction="20000"/>
           </a:bodyPr>
           <a:lstStyle/>
           <a:p>
-            <a:r>
-              <a:rPr lang="ru-RU" dirty="0" smtClean="0"/>
+            <a:pPr marL="0" indent="0">
+              <a:buNone/>
+            </a:pPr>
+            <a:r>
+              <a:rPr lang="ru-RU" dirty="0" smtClean="0">
+                <a:solidFill>
+                  <a:schemeClr val="bg1">
+                    <a:lumMod val="95000"/>
+                  </a:schemeClr>
+                </a:solidFill>
+              </a:rPr>
               <a:t>Внешний </a:t>
             </a:r>
             <a:r>
-              <a:rPr lang="ru-RU" dirty="0"/>
-              <a:t>отступ на всех четырех сторонах элемента.</a:t>
-            </a:r>
-            <a:endParaRPr lang="ru-RU" dirty="0" smtClean="0"/>
-          </a:p>
-          <a:p>
-            <a:endParaRPr lang="ru-RU" dirty="0"/>
-          </a:p>
-          <a:p>
-            <a:r>
-              <a:rPr lang="ru-RU" dirty="0" smtClean="0"/>
-              <a:t>/* </a:t>
-            </a:r>
-            <a:r>
-              <a:rPr lang="ru-RU" dirty="0"/>
-              <a:t>Применяется ко всем четырём сторонам */</a:t>
-            </a:r>
-          </a:p>
-          <a:p>
-            <a:r>
-              <a:rPr lang="en-US" dirty="0"/>
-              <a:t>margin: 1em;</a:t>
-            </a:r>
-          </a:p>
-          <a:p>
-            <a:endParaRPr lang="en-US" dirty="0"/>
-          </a:p>
-          <a:p>
-            <a:r>
-              <a:rPr lang="en-US" dirty="0"/>
-              <a:t>/* </a:t>
-            </a:r>
-            <a:r>
-              <a:rPr lang="ru-RU" dirty="0"/>
-              <a:t>по вертикали | по горизонтали */</a:t>
-            </a:r>
-          </a:p>
-          <a:p>
-            <a:r>
-              <a:rPr lang="en-US" dirty="0"/>
-              <a:t>margin: 5% auto</a:t>
-            </a:r>
-            <a:r>
-              <a:rPr lang="en-US" dirty="0" smtClean="0"/>
-              <a:t>;</a:t>
-            </a:r>
-          </a:p>
-          <a:p>
-            <a:r>
-              <a:rPr lang="en-US" dirty="0" smtClean="0"/>
-              <a:t>margin: 0 auto; - </a:t>
-            </a:r>
-            <a:r>
-              <a:rPr lang="ru-RU" dirty="0" smtClean="0"/>
-              <a:t>центровка элемента по горизонтали</a:t>
-            </a:r>
-            <a:endParaRPr lang="en-US" dirty="0"/>
-          </a:p>
-          <a:p>
-            <a:endParaRPr lang="en-US" dirty="0"/>
-          </a:p>
-          <a:p>
-            <a:r>
-              <a:rPr lang="en-US" dirty="0"/>
-              <a:t>/* </a:t>
-            </a:r>
-            <a:r>
-              <a:rPr lang="ru-RU" dirty="0"/>
-              <a:t>сверху | горизонтально | снизу */</a:t>
-            </a:r>
-          </a:p>
-          <a:p>
-            <a:r>
-              <a:rPr lang="en-US" dirty="0"/>
-              <a:t>margin: 1em auto 2em; </a:t>
-            </a:r>
-          </a:p>
-          <a:p>
-            <a:endParaRPr lang="en-US" dirty="0"/>
-          </a:p>
-          <a:p>
-            <a:r>
-              <a:rPr lang="en-US" dirty="0"/>
-              <a:t>/* </a:t>
-            </a:r>
-            <a:r>
-              <a:rPr lang="ru-RU" dirty="0"/>
-              <a:t>сверху | справа | снизу | слева */</a:t>
-            </a:r>
-          </a:p>
-          <a:p>
-            <a:r>
-              <a:rPr lang="en-US" dirty="0"/>
-              <a:t>margin: 2px 1em 0 auto</a:t>
-            </a:r>
-            <a:r>
-              <a:rPr lang="en-US" dirty="0" smtClean="0"/>
-              <a:t>;</a:t>
-            </a:r>
-            <a:endParaRPr lang="ru-RU" dirty="0" smtClean="0"/>
-          </a:p>
-          <a:p>
-            <a:endParaRPr lang="ru-RU" dirty="0"/>
-          </a:p>
-          <a:p>
+              <a:rPr lang="ru-RU" dirty="0">
+                <a:solidFill>
+                  <a:schemeClr val="bg1">
+                    <a:lumMod val="95000"/>
+                  </a:schemeClr>
+                </a:solidFill>
+              </a:rPr>
+              <a:t>отступ на всех четырех сторонах элемента</a:t>
+            </a:r>
+            <a:r>
+              <a:rPr lang="ru-RU" dirty="0" smtClean="0">
+                <a:solidFill>
+                  <a:schemeClr val="bg1">
+                    <a:lumMod val="95000"/>
+                  </a:schemeClr>
+                </a:solidFill>
+              </a:rPr>
+              <a:t>.</a:t>
+            </a:r>
+            <a:endParaRPr lang="en-US" dirty="0" smtClean="0">
+              <a:solidFill>
+                <a:schemeClr val="bg1">
+                  <a:lumMod val="95000"/>
+                </a:schemeClr>
+              </a:solidFill>
+            </a:endParaRPr>
+          </a:p>
+          <a:p>
+            <a:pPr marL="0" indent="0">
+              <a:buNone/>
+            </a:pPr>
             <a:r>
               <a:rPr lang="en-US" dirty="0">
                 <a:hlinkClick r:id="rId2"/>
               </a:rPr>
-              <a:t>https://developer.mozilla.org/ru/docs/Web/CSS/margin</a:t>
-            </a:r>
+              <a:t>https://</a:t>
+            </a:r>
+            <a:r>
+              <a:rPr lang="en-US" dirty="0" smtClean="0">
+                <a:hlinkClick r:id="rId2"/>
+              </a:rPr>
+              <a:t>developer.mozilla.org/ru/docs/Web/CSS/margin</a:t>
+            </a:r>
+            <a:endParaRPr lang="ru-RU" dirty="0" smtClean="0"/>
+          </a:p>
+          <a:p>
+            <a:pPr marL="0" indent="0">
+              <a:buNone/>
+            </a:pPr>
+            <a:endParaRPr lang="ru-RU" dirty="0"/>
+          </a:p>
+          <a:p>
+            <a:pPr marL="0" indent="0">
+              <a:buNone/>
+            </a:pPr>
+            <a:r>
+              <a:rPr lang="ru-RU" dirty="0" smtClean="0"/>
+              <a:t>/* </a:t>
+            </a:r>
+            <a:r>
+              <a:rPr lang="ru-RU" dirty="0"/>
+              <a:t>Применяется ко всем четырём сторонам */</a:t>
+            </a:r>
+          </a:p>
+          <a:p>
+            <a:pPr marL="0" indent="0">
+              <a:buNone/>
+            </a:pPr>
+            <a:r>
+              <a:rPr lang="en-US" dirty="0"/>
+              <a:t>margin: 1em;</a:t>
+            </a:r>
+          </a:p>
+          <a:p>
+            <a:pPr marL="0" indent="0">
+              <a:buNone/>
+            </a:pPr>
+            <a:endParaRPr lang="en-US" dirty="0"/>
+          </a:p>
+          <a:p>
+            <a:pPr marL="0" indent="0">
+              <a:buNone/>
+            </a:pPr>
+            <a:r>
+              <a:rPr lang="en-US" dirty="0"/>
+              <a:t>/* </a:t>
+            </a:r>
+            <a:r>
+              <a:rPr lang="ru-RU" dirty="0"/>
+              <a:t>по вертикали | по горизонтали */</a:t>
+            </a:r>
+          </a:p>
+          <a:p>
+            <a:pPr marL="0" indent="0">
+              <a:buNone/>
+            </a:pPr>
+            <a:r>
+              <a:rPr lang="en-US" dirty="0"/>
+              <a:t>margin: 5% auto</a:t>
+            </a:r>
+            <a:r>
+              <a:rPr lang="en-US" dirty="0" smtClean="0"/>
+              <a:t>;</a:t>
+            </a:r>
+          </a:p>
+          <a:p>
+            <a:pPr marL="0" indent="0">
+              <a:buNone/>
+            </a:pPr>
+            <a:r>
+              <a:rPr lang="en-US" dirty="0" smtClean="0"/>
+              <a:t>margin: 0 auto; - </a:t>
+            </a:r>
+            <a:r>
+              <a:rPr lang="ru-RU" dirty="0" smtClean="0"/>
+              <a:t>центровка элемента по горизонтали</a:t>
+            </a:r>
+            <a:endParaRPr lang="en-US" dirty="0"/>
+          </a:p>
+          <a:p>
+            <a:pPr marL="0" indent="0">
+              <a:buNone/>
+            </a:pPr>
+            <a:endParaRPr lang="en-US" dirty="0"/>
+          </a:p>
+          <a:p>
+            <a:pPr marL="0" indent="0">
+              <a:buNone/>
+            </a:pPr>
+            <a:r>
+              <a:rPr lang="en-US" dirty="0"/>
+              <a:t>/* </a:t>
+            </a:r>
+            <a:r>
+              <a:rPr lang="ru-RU" dirty="0"/>
+              <a:t>сверху | горизонтально | снизу */</a:t>
+            </a:r>
+          </a:p>
+          <a:p>
+            <a:pPr marL="0" indent="0">
+              <a:buNone/>
+            </a:pPr>
+            <a:r>
+              <a:rPr lang="en-US" dirty="0"/>
+              <a:t>margin: 1em auto 2em; </a:t>
+            </a:r>
+          </a:p>
+          <a:p>
+            <a:pPr marL="0" indent="0">
+              <a:buNone/>
+            </a:pPr>
+            <a:endParaRPr lang="en-US" dirty="0"/>
+          </a:p>
+          <a:p>
+            <a:pPr marL="0" indent="0">
+              <a:buNone/>
+            </a:pPr>
+            <a:r>
+              <a:rPr lang="en-US" dirty="0"/>
+              <a:t>/* </a:t>
+            </a:r>
+            <a:r>
+              <a:rPr lang="ru-RU" dirty="0"/>
+              <a:t>сверху | справа | снизу | слева */</a:t>
+            </a:r>
+          </a:p>
+          <a:p>
+            <a:pPr marL="0" indent="0">
+              <a:buNone/>
+            </a:pPr>
+            <a:r>
+              <a:rPr lang="en-US" dirty="0"/>
+              <a:t>margin: 2px 1em 0 auto</a:t>
+            </a:r>
+            <a:r>
+              <a:rPr lang="en-US" dirty="0" smtClean="0"/>
+              <a:t>;</a:t>
+            </a:r>
+          </a:p>
+          <a:p>
+            <a:pPr marL="0" indent="0">
+              <a:buNone/>
+            </a:pPr>
+            <a:endParaRPr lang="en-US" dirty="0"/>
+          </a:p>
+          <a:p>
+            <a:pPr marL="0" indent="0">
+              <a:buNone/>
+            </a:pPr>
+            <a:r>
+              <a:rPr lang="en-US" dirty="0" smtClean="0">
+                <a:solidFill>
+                  <a:schemeClr val="bg1">
+                    <a:lumMod val="95000"/>
+                  </a:schemeClr>
+                </a:solidFill>
+              </a:rPr>
+              <a:t>margin-top			margin-left</a:t>
+            </a:r>
+          </a:p>
+          <a:p>
+            <a:pPr marL="0" indent="0">
+              <a:buNone/>
+            </a:pPr>
+            <a:r>
+              <a:rPr lang="en-US" dirty="0" smtClean="0">
+                <a:solidFill>
+                  <a:schemeClr val="bg1">
+                    <a:lumMod val="95000"/>
+                  </a:schemeClr>
+                </a:solidFill>
+              </a:rPr>
+              <a:t>margin-bottom		margin-right</a:t>
+            </a:r>
+            <a:endParaRPr lang="ru-RU" dirty="0" smtClean="0">
+              <a:solidFill>
+                <a:schemeClr val="bg1">
+                  <a:lumMod val="95000"/>
+                </a:schemeClr>
+              </a:solidFill>
+            </a:endParaRPr>
+          </a:p>
+          <a:p>
+            <a:pPr marL="0" indent="0">
+              <a:buNone/>
+            </a:pPr>
             <a:endParaRPr lang="ru-RU" dirty="0"/>
           </a:p>
         </p:txBody>
@@ -5900,116 +6150,65 @@
         <p:spPr/>
         <p:txBody>
           <a:bodyPr>
-            <a:normAutofit fontScale="55000" lnSpcReduction="20000"/>
+            <a:normAutofit fontScale="47500" lnSpcReduction="20000"/>
           </a:bodyPr>
           <a:lstStyle/>
           <a:p>
-            <a:r>
-              <a:rPr lang="ru-RU" dirty="0"/>
+            <a:pPr marL="0" indent="0">
+              <a:buNone/>
+            </a:pPr>
+            <a:r>
+              <a:rPr lang="ru-RU" dirty="0">
+                <a:solidFill>
+                  <a:schemeClr val="bg1">
+                    <a:lumMod val="95000"/>
+                  </a:schemeClr>
+                </a:solidFill>
+              </a:rPr>
               <a:t>В</a:t>
             </a:r>
             <a:r>
-              <a:rPr lang="ru-RU" dirty="0" smtClean="0"/>
+              <a:rPr lang="ru-RU" dirty="0" smtClean="0">
+                <a:solidFill>
+                  <a:schemeClr val="bg1">
+                    <a:lumMod val="95000"/>
+                  </a:schemeClr>
+                </a:solidFill>
+              </a:rPr>
               <a:t>нутренние</a:t>
             </a:r>
             <a:r>
-              <a:rPr lang="ru-RU" dirty="0"/>
+              <a:rPr lang="ru-RU" dirty="0">
+                <a:solidFill>
+                  <a:schemeClr val="bg1">
+                    <a:lumMod val="95000"/>
+                  </a:schemeClr>
+                </a:solidFill>
+              </a:rPr>
               <a:t> отступы/поля со всех сторон элемента</a:t>
             </a:r>
             <a:r>
-              <a:rPr lang="ru-RU" dirty="0" smtClean="0"/>
+              <a:rPr lang="ru-RU" dirty="0" smtClean="0">
+                <a:solidFill>
+                  <a:schemeClr val="bg1">
+                    <a:lumMod val="95000"/>
+                  </a:schemeClr>
+                </a:solidFill>
+              </a:rPr>
               <a:t>.</a:t>
             </a:r>
-          </a:p>
-          <a:p>
-            <a:endParaRPr lang="ru-RU" dirty="0"/>
-          </a:p>
-          <a:p>
-            <a:r>
-              <a:rPr lang="ru-RU" dirty="0"/>
-              <a:t>/* Применяется для всех 4 сторон */</a:t>
-            </a:r>
-          </a:p>
-          <a:p>
-            <a:r>
-              <a:rPr lang="en-US" dirty="0"/>
-              <a:t>padding: 1em;</a:t>
-            </a:r>
-          </a:p>
-          <a:p>
-            <a:endParaRPr lang="en-US" dirty="0"/>
-          </a:p>
-          <a:p>
-            <a:r>
-              <a:rPr lang="en-US" dirty="0"/>
-              <a:t>/* </a:t>
-            </a:r>
-            <a:r>
-              <a:rPr lang="ru-RU" dirty="0"/>
-              <a:t>По вертикали | По горизонтали */</a:t>
-            </a:r>
-          </a:p>
-          <a:p>
-            <a:r>
-              <a:rPr lang="en-US" dirty="0"/>
-              <a:t>padding: 5% 10%;</a:t>
-            </a:r>
-          </a:p>
-          <a:p>
-            <a:endParaRPr lang="en-US" dirty="0"/>
-          </a:p>
-          <a:p>
-            <a:r>
-              <a:rPr lang="en-US" dirty="0"/>
-              <a:t>/* </a:t>
-            </a:r>
-            <a:r>
-              <a:rPr lang="ru-RU" dirty="0"/>
-              <a:t>Сверху | По горизонтали | Снизу */</a:t>
-            </a:r>
-          </a:p>
-          <a:p>
-            <a:r>
-              <a:rPr lang="en-US" dirty="0"/>
-              <a:t>padding: 1em 2em </a:t>
-            </a:r>
-            <a:r>
-              <a:rPr lang="en-US" dirty="0" err="1"/>
-              <a:t>2em</a:t>
-            </a:r>
-            <a:r>
-              <a:rPr lang="en-US" dirty="0"/>
-              <a:t>; </a:t>
-            </a:r>
-          </a:p>
-          <a:p>
-            <a:endParaRPr lang="en-US" dirty="0"/>
-          </a:p>
-          <a:p>
-            <a:r>
-              <a:rPr lang="en-US" dirty="0"/>
-              <a:t>/* </a:t>
-            </a:r>
-            <a:r>
-              <a:rPr lang="ru-RU" dirty="0"/>
-              <a:t>Сверху | Справа | Снизу | Слева */</a:t>
-            </a:r>
-          </a:p>
-          <a:p>
-            <a:r>
-              <a:rPr lang="en-US" dirty="0"/>
-              <a:t>padding: 2px 1em 0 1em</a:t>
-            </a:r>
-            <a:r>
-              <a:rPr lang="en-US" dirty="0" smtClean="0"/>
-              <a:t>;</a:t>
-            </a:r>
-            <a:endParaRPr lang="ru-RU" dirty="0" smtClean="0"/>
-          </a:p>
-          <a:p>
-            <a:endParaRPr lang="ru-RU" dirty="0"/>
-          </a:p>
-          <a:p>
+            <a:endParaRPr lang="en-US" dirty="0" smtClean="0">
+              <a:solidFill>
+                <a:schemeClr val="bg1">
+                  <a:lumMod val="95000"/>
+                </a:schemeClr>
+              </a:solidFill>
+            </a:endParaRPr>
+          </a:p>
+          <a:p>
+            <a:pPr marL="0" indent="0">
+              <a:buNone/>
+            </a:pPr>
             <a:r>
               <a:rPr lang="en-US" dirty="0">
                 <a:hlinkClick r:id="rId2"/>
@@ -6018,12 +6217,1500 @@
             </a:r>
             <a:endParaRPr lang="ru-RU" dirty="0"/>
           </a:p>
+          <a:p>
+            <a:pPr marL="0" indent="0">
+              <a:buNone/>
+            </a:pPr>
+            <a:endParaRPr lang="ru-RU" dirty="0"/>
+          </a:p>
+          <a:p>
+            <a:pPr marL="0" indent="0">
+              <a:buNone/>
+            </a:pPr>
+            <a:r>
+              <a:rPr lang="ru-RU" dirty="0"/>
+              <a:t>/* Применяется для всех 4 сторон */</a:t>
+            </a:r>
+          </a:p>
+          <a:p>
+            <a:pPr marL="0" indent="0">
+              <a:buNone/>
+            </a:pPr>
+            <a:r>
+              <a:rPr lang="en-US" dirty="0"/>
+              <a:t>padding: 1em;</a:t>
+            </a:r>
+          </a:p>
+          <a:p>
+            <a:pPr marL="0" indent="0">
+              <a:buNone/>
+            </a:pPr>
+            <a:endParaRPr lang="en-US" dirty="0"/>
+          </a:p>
+          <a:p>
+            <a:pPr marL="0" indent="0">
+              <a:buNone/>
+            </a:pPr>
+            <a:r>
+              <a:rPr lang="en-US" dirty="0"/>
+              <a:t>/* </a:t>
+            </a:r>
+            <a:r>
+              <a:rPr lang="ru-RU" dirty="0"/>
+              <a:t>По вертикали | По горизонтали */</a:t>
+            </a:r>
+          </a:p>
+          <a:p>
+            <a:pPr marL="0" indent="0">
+              <a:buNone/>
+            </a:pPr>
+            <a:r>
+              <a:rPr lang="en-US" dirty="0"/>
+              <a:t>padding: 5% 10%;</a:t>
+            </a:r>
+          </a:p>
+          <a:p>
+            <a:pPr marL="0" indent="0">
+              <a:buNone/>
+            </a:pPr>
+            <a:endParaRPr lang="en-US" dirty="0"/>
+          </a:p>
+          <a:p>
+            <a:pPr marL="0" indent="0">
+              <a:buNone/>
+            </a:pPr>
+            <a:r>
+              <a:rPr lang="en-US" dirty="0"/>
+              <a:t>/* </a:t>
+            </a:r>
+            <a:r>
+              <a:rPr lang="ru-RU" dirty="0"/>
+              <a:t>Сверху | По горизонтали | Снизу */</a:t>
+            </a:r>
+          </a:p>
+          <a:p>
+            <a:pPr marL="0" indent="0">
+              <a:buNone/>
+            </a:pPr>
+            <a:r>
+              <a:rPr lang="en-US" dirty="0"/>
+              <a:t>padding: 1em 2em </a:t>
+            </a:r>
+            <a:r>
+              <a:rPr lang="en-US" dirty="0" err="1"/>
+              <a:t>2em</a:t>
+            </a:r>
+            <a:r>
+              <a:rPr lang="en-US" dirty="0"/>
+              <a:t>; </a:t>
+            </a:r>
+          </a:p>
+          <a:p>
+            <a:pPr marL="0" indent="0">
+              <a:buNone/>
+            </a:pPr>
+            <a:endParaRPr lang="en-US" dirty="0"/>
+          </a:p>
+          <a:p>
+            <a:pPr marL="0" indent="0">
+              <a:buNone/>
+            </a:pPr>
+            <a:r>
+              <a:rPr lang="en-US" dirty="0"/>
+              <a:t>/* </a:t>
+            </a:r>
+            <a:r>
+              <a:rPr lang="ru-RU" dirty="0"/>
+              <a:t>Сверху | Справа | Снизу | Слева */</a:t>
+            </a:r>
+          </a:p>
+          <a:p>
+            <a:pPr marL="0" indent="0">
+              <a:buNone/>
+            </a:pPr>
+            <a:r>
+              <a:rPr lang="en-US" dirty="0"/>
+              <a:t>padding: 2px 1em 0 1em</a:t>
+            </a:r>
+            <a:r>
+              <a:rPr lang="en-US" dirty="0" smtClean="0"/>
+              <a:t>;</a:t>
+            </a:r>
+            <a:endParaRPr lang="ru-RU" dirty="0" smtClean="0"/>
+          </a:p>
+          <a:p>
+            <a:pPr marL="0" indent="0">
+              <a:buNone/>
+            </a:pPr>
+            <a:endParaRPr lang="ru-RU" dirty="0"/>
+          </a:p>
+          <a:p>
+            <a:pPr marL="0" indent="0">
+              <a:buNone/>
+            </a:pPr>
+            <a:r>
+              <a:rPr lang="en-US" dirty="0" smtClean="0">
+                <a:solidFill>
+                  <a:schemeClr val="bg1">
+                    <a:lumMod val="95000"/>
+                  </a:schemeClr>
+                </a:solidFill>
+              </a:rPr>
+              <a:t>padding-top		padding-left</a:t>
+            </a:r>
+          </a:p>
+          <a:p>
+            <a:pPr marL="0" indent="0">
+              <a:buNone/>
+            </a:pPr>
+            <a:r>
+              <a:rPr lang="en-US" dirty="0" smtClean="0">
+                <a:solidFill>
+                  <a:schemeClr val="bg1">
+                    <a:lumMod val="95000"/>
+                  </a:schemeClr>
+                </a:solidFill>
+              </a:rPr>
+              <a:t>padding-bottom		padding-right</a:t>
+            </a:r>
+            <a:endParaRPr lang="ru-RU" dirty="0" smtClean="0">
+              <a:solidFill>
+                <a:schemeClr val="bg1">
+                  <a:lumMod val="95000"/>
+                </a:schemeClr>
+              </a:solidFill>
+            </a:endParaRPr>
+          </a:p>
         </p:txBody>
       </p:sp>
     </p:spTree>
     <p:extLst>
       <p:ext uri="{BB962C8B-B14F-4D97-AF65-F5344CB8AC3E}">
         <p14:creationId xmlns:p14="http://schemas.microsoft.com/office/powerpoint/2010/main" val="743330850"/>
+      </p:ext>
+    </p:extLst>
+  </p:cSld>
+  <p:clrMapOvr>
+    <a:masterClrMapping/>
+  </p:clrMapOvr>
+</p:sld>
+</file>
+
+<file path=ppt/slides/slide24.xml><?xml version="1.0" encoding="utf-8"?>
+<p:sld xmlns:a="http://schemas.openxmlformats.org/drawingml/2006/main" xmlns:r="http://schemas.openxmlformats.org/officeDocument/2006/relationships" xmlns:p="http://schemas.openxmlformats.org/presentationml/2006/main">
+  <p:cSld>
+    <p:bg>
+      <p:bgPr>
+        <a:solidFill>
+          <a:srgbClr val="8BC34A"/>
+        </a:solidFill>
+        <a:effectLst/>
+      </p:bgPr>
+    </p:bg>
+    <p:spTree>
+      <p:nvGrpSpPr>
+        <p:cNvPr id="1" name=""/>
+        <p:cNvGrpSpPr/>
+        <p:nvPr/>
+      </p:nvGrpSpPr>
+      <p:grpSpPr>
+        <a:xfrm>
+          <a:off x="0" y="0"/>
+          <a:ext cx="0" cy="0"/>
+          <a:chOff x="0" y="0"/>
+          <a:chExt cx="0" cy="0"/>
+        </a:xfrm>
+      </p:grpSpPr>
+      <p:sp>
+        <p:nvSpPr>
+          <p:cNvPr id="2" name="Заголовок 1"/>
+          <p:cNvSpPr>
+            <a:spLocks noGrp="1"/>
+          </p:cNvSpPr>
+          <p:nvPr>
+            <p:ph type="title"/>
+          </p:nvPr>
+        </p:nvSpPr>
+        <p:spPr/>
+        <p:txBody>
+          <a:bodyPr/>
+          <a:lstStyle/>
+          <a:p>
+            <a:r>
+              <a:rPr lang="en-US" dirty="0" smtClean="0"/>
+              <a:t>border</a:t>
+            </a:r>
+            <a:endParaRPr lang="ru-RU" dirty="0"/>
+          </a:p>
+        </p:txBody>
+      </p:sp>
+      <p:sp>
+        <p:nvSpPr>
+          <p:cNvPr id="3" name="Объект 2"/>
+          <p:cNvSpPr>
+            <a:spLocks noGrp="1"/>
+          </p:cNvSpPr>
+          <p:nvPr>
+            <p:ph idx="1"/>
+          </p:nvPr>
+        </p:nvSpPr>
+        <p:spPr/>
+        <p:txBody>
+          <a:bodyPr>
+            <a:normAutofit fontScale="70000" lnSpcReduction="20000"/>
+          </a:bodyPr>
+          <a:lstStyle/>
+          <a:p>
+            <a:pPr marL="0" indent="0">
+              <a:buNone/>
+            </a:pPr>
+            <a:r>
+              <a:rPr lang="ru-RU" dirty="0">
+                <a:solidFill>
+                  <a:schemeClr val="bg1">
+                    <a:lumMod val="95000"/>
+                  </a:schemeClr>
+                </a:solidFill>
+              </a:rPr>
+              <a:t>Границы элемента</a:t>
+            </a:r>
+          </a:p>
+          <a:p>
+            <a:pPr marL="0" indent="0">
+              <a:buNone/>
+            </a:pPr>
+            <a:r>
+              <a:rPr lang="en-US" dirty="0" smtClean="0">
+                <a:hlinkClick r:id="rId2"/>
+              </a:rPr>
+              <a:t>https</a:t>
+            </a:r>
+            <a:r>
+              <a:rPr lang="en-US" dirty="0">
+                <a:hlinkClick r:id="rId2"/>
+              </a:rPr>
+              <a:t>://</a:t>
+            </a:r>
+            <a:r>
+              <a:rPr lang="en-US" dirty="0" smtClean="0">
+                <a:hlinkClick r:id="rId2"/>
+              </a:rPr>
+              <a:t>developer.mozilla.org/ru/docs/Web/CSS/border</a:t>
+            </a:r>
+            <a:endParaRPr lang="ru-RU" dirty="0" smtClean="0"/>
+          </a:p>
+          <a:p>
+            <a:pPr marL="0" indent="0">
+              <a:buNone/>
+            </a:pPr>
+            <a:endParaRPr lang="en-US" dirty="0" smtClean="0"/>
+          </a:p>
+          <a:p>
+            <a:pPr marL="0" indent="0">
+              <a:buNone/>
+            </a:pPr>
+            <a:r>
+              <a:rPr lang="en-US" dirty="0" smtClean="0"/>
+              <a:t>border</a:t>
+            </a:r>
+            <a:r>
+              <a:rPr lang="en-US" dirty="0"/>
+              <a:t>: solid;</a:t>
+            </a:r>
+          </a:p>
+          <a:p>
+            <a:pPr marL="0" indent="0">
+              <a:buNone/>
+            </a:pPr>
+            <a:r>
+              <a:rPr lang="en-US" dirty="0"/>
+              <a:t>border: dashed red;</a:t>
+            </a:r>
+          </a:p>
+          <a:p>
+            <a:pPr marL="0" indent="0">
+              <a:buNone/>
+            </a:pPr>
+            <a:r>
+              <a:rPr lang="en-US" dirty="0"/>
+              <a:t>border: 1rem solid;</a:t>
+            </a:r>
+          </a:p>
+          <a:p>
+            <a:pPr marL="0" indent="0">
+              <a:buNone/>
+            </a:pPr>
+            <a:r>
+              <a:rPr lang="en-US" dirty="0"/>
+              <a:t>border: thick double #32a1ce;</a:t>
+            </a:r>
+          </a:p>
+          <a:p>
+            <a:pPr marL="0" indent="0">
+              <a:buNone/>
+            </a:pPr>
+            <a:r>
+              <a:rPr lang="en-US" dirty="0"/>
+              <a:t>border: 4mm ridge </a:t>
+            </a:r>
+            <a:r>
+              <a:rPr lang="en-US" dirty="0" err="1"/>
+              <a:t>rgba</a:t>
+            </a:r>
+            <a:r>
+              <a:rPr lang="en-US" dirty="0"/>
+              <a:t>(170, 50, 220, .6</a:t>
+            </a:r>
+            <a:r>
+              <a:rPr lang="en-US" dirty="0" smtClean="0"/>
+              <a:t>);</a:t>
+            </a:r>
+          </a:p>
+          <a:p>
+            <a:pPr marL="0" indent="0">
+              <a:buNone/>
+            </a:pPr>
+            <a:endParaRPr lang="en-US" dirty="0"/>
+          </a:p>
+          <a:p>
+            <a:pPr marL="0" indent="0">
+              <a:buNone/>
+            </a:pPr>
+            <a:r>
+              <a:rPr lang="en-US" dirty="0" smtClean="0"/>
+              <a:t>border: 1px solid #212121;</a:t>
+            </a:r>
+          </a:p>
+          <a:p>
+            <a:pPr marL="0" indent="0">
+              <a:buNone/>
+            </a:pPr>
+            <a:endParaRPr lang="en-US" dirty="0"/>
+          </a:p>
+          <a:p>
+            <a:pPr marL="0" indent="0">
+              <a:buNone/>
+            </a:pPr>
+            <a:r>
+              <a:rPr lang="en-US" dirty="0" smtClean="0">
+                <a:solidFill>
+                  <a:schemeClr val="bg1">
+                    <a:lumMod val="95000"/>
+                  </a:schemeClr>
+                </a:solidFill>
+              </a:rPr>
+              <a:t>border-top</a:t>
+            </a:r>
+            <a:r>
+              <a:rPr lang="ru-RU" dirty="0">
+                <a:solidFill>
+                  <a:schemeClr val="bg1">
+                    <a:lumMod val="95000"/>
+                  </a:schemeClr>
+                </a:solidFill>
+              </a:rPr>
+              <a:t>	</a:t>
+            </a:r>
+            <a:r>
+              <a:rPr lang="ru-RU" dirty="0" smtClean="0">
+                <a:solidFill>
+                  <a:schemeClr val="bg1">
+                    <a:lumMod val="95000"/>
+                  </a:schemeClr>
+                </a:solidFill>
+              </a:rPr>
+              <a:t>	</a:t>
+            </a:r>
+            <a:r>
+              <a:rPr lang="en-US" dirty="0" smtClean="0">
+                <a:solidFill>
+                  <a:schemeClr val="bg1">
+                    <a:lumMod val="95000"/>
+                  </a:schemeClr>
+                </a:solidFill>
+              </a:rPr>
+              <a:t>border-left</a:t>
+            </a:r>
+          </a:p>
+          <a:p>
+            <a:pPr marL="0" indent="0">
+              <a:buNone/>
+            </a:pPr>
+            <a:r>
+              <a:rPr lang="en-US" dirty="0" smtClean="0">
+                <a:solidFill>
+                  <a:schemeClr val="bg1">
+                    <a:lumMod val="95000"/>
+                  </a:schemeClr>
+                </a:solidFill>
+              </a:rPr>
+              <a:t>border-bottom</a:t>
+            </a:r>
+            <a:r>
+              <a:rPr lang="ru-RU" dirty="0" smtClean="0">
+                <a:solidFill>
+                  <a:schemeClr val="bg1">
+                    <a:lumMod val="95000"/>
+                  </a:schemeClr>
+                </a:solidFill>
+              </a:rPr>
+              <a:t>		</a:t>
+            </a:r>
+            <a:r>
+              <a:rPr lang="en-US" dirty="0" smtClean="0">
+                <a:solidFill>
+                  <a:schemeClr val="bg1">
+                    <a:lumMod val="95000"/>
+                  </a:schemeClr>
+                </a:solidFill>
+              </a:rPr>
+              <a:t>border-right</a:t>
+            </a:r>
+            <a:endParaRPr lang="en-US" dirty="0">
+              <a:solidFill>
+                <a:schemeClr val="bg1">
+                  <a:lumMod val="95000"/>
+                </a:schemeClr>
+              </a:solidFill>
+            </a:endParaRPr>
+          </a:p>
+        </p:txBody>
+      </p:sp>
+    </p:spTree>
+    <p:extLst>
+      <p:ext uri="{BB962C8B-B14F-4D97-AF65-F5344CB8AC3E}">
+        <p14:creationId xmlns:p14="http://schemas.microsoft.com/office/powerpoint/2010/main" val="3736325195"/>
+      </p:ext>
+    </p:extLst>
+  </p:cSld>
+  <p:clrMapOvr>
+    <a:masterClrMapping/>
+  </p:clrMapOvr>
+</p:sld>
+</file>
+
+<file path=ppt/slides/slide25.xml><?xml version="1.0" encoding="utf-8"?>
+<p:sld xmlns:a="http://schemas.openxmlformats.org/drawingml/2006/main" xmlns:r="http://schemas.openxmlformats.org/officeDocument/2006/relationships" xmlns:p="http://schemas.openxmlformats.org/presentationml/2006/main">
+  <p:cSld>
+    <p:bg>
+      <p:bgPr>
+        <a:solidFill>
+          <a:srgbClr val="8BC34A"/>
+        </a:solidFill>
+        <a:effectLst/>
+      </p:bgPr>
+    </p:bg>
+    <p:spTree>
+      <p:nvGrpSpPr>
+        <p:cNvPr id="1" name=""/>
+        <p:cNvGrpSpPr/>
+        <p:nvPr/>
+      </p:nvGrpSpPr>
+      <p:grpSpPr>
+        <a:xfrm>
+          <a:off x="0" y="0"/>
+          <a:ext cx="0" cy="0"/>
+          <a:chOff x="0" y="0"/>
+          <a:chExt cx="0" cy="0"/>
+        </a:xfrm>
+      </p:grpSpPr>
+      <p:sp>
+        <p:nvSpPr>
+          <p:cNvPr id="2" name="Заголовок 1"/>
+          <p:cNvSpPr>
+            <a:spLocks noGrp="1"/>
+          </p:cNvSpPr>
+          <p:nvPr>
+            <p:ph type="title"/>
+          </p:nvPr>
+        </p:nvSpPr>
+        <p:spPr/>
+        <p:txBody>
+          <a:bodyPr/>
+          <a:lstStyle/>
+          <a:p>
+            <a:r>
+              <a:rPr lang="ru-RU" dirty="0" smtClean="0"/>
+              <a:t>Модель элемента</a:t>
+            </a:r>
+            <a:endParaRPr lang="ru-RU" dirty="0"/>
+          </a:p>
+        </p:txBody>
+      </p:sp>
+      <p:pic>
+        <p:nvPicPr>
+          <p:cNvPr id="4" name="Объект 3"/>
+          <p:cNvPicPr>
+            <a:picLocks noGrp="1" noChangeAspect="1"/>
+          </p:cNvPicPr>
+          <p:nvPr>
+            <p:ph idx="1"/>
+          </p:nvPr>
+        </p:nvPicPr>
+        <p:blipFill>
+          <a:blip r:embed="rId2">
+            <a:extLst>
+              <a:ext uri="{28A0092B-C50C-407E-A947-70E740481C1C}">
+                <a14:useLocalDpi xmlns:a14="http://schemas.microsoft.com/office/drawing/2010/main" val="0"/>
+              </a:ext>
+            </a:extLst>
+          </a:blip>
+          <a:stretch>
+            <a:fillRect/>
+          </a:stretch>
+        </p:blipFill>
+        <p:spPr>
+          <a:xfrm>
+            <a:off x="495090" y="1888230"/>
+            <a:ext cx="8153819" cy="3949903"/>
+          </a:xfrm>
+        </p:spPr>
+      </p:pic>
+    </p:spTree>
+    <p:extLst>
+      <p:ext uri="{BB962C8B-B14F-4D97-AF65-F5344CB8AC3E}">
+        <p14:creationId xmlns:p14="http://schemas.microsoft.com/office/powerpoint/2010/main" val="3563178956"/>
+      </p:ext>
+    </p:extLst>
+  </p:cSld>
+  <p:clrMapOvr>
+    <a:masterClrMapping/>
+  </p:clrMapOvr>
+</p:sld>
+</file>
+
+<file path=ppt/slides/slide26.xml><?xml version="1.0" encoding="utf-8"?>
+<p:sld xmlns:a="http://schemas.openxmlformats.org/drawingml/2006/main" xmlns:r="http://schemas.openxmlformats.org/officeDocument/2006/relationships" xmlns:p="http://schemas.openxmlformats.org/presentationml/2006/main">
+  <p:cSld>
+    <p:bg>
+      <p:bgPr>
+        <a:solidFill>
+          <a:srgbClr val="8BC34A"/>
+        </a:solidFill>
+        <a:effectLst/>
+      </p:bgPr>
+    </p:bg>
+    <p:spTree>
+      <p:nvGrpSpPr>
+        <p:cNvPr id="1" name=""/>
+        <p:cNvGrpSpPr/>
+        <p:nvPr/>
+      </p:nvGrpSpPr>
+      <p:grpSpPr>
+        <a:xfrm>
+          <a:off x="0" y="0"/>
+          <a:ext cx="0" cy="0"/>
+          <a:chOff x="0" y="0"/>
+          <a:chExt cx="0" cy="0"/>
+        </a:xfrm>
+      </p:grpSpPr>
+      <p:sp>
+        <p:nvSpPr>
+          <p:cNvPr id="2" name="Заголовок 1"/>
+          <p:cNvSpPr>
+            <a:spLocks noGrp="1"/>
+          </p:cNvSpPr>
+          <p:nvPr>
+            <p:ph type="title"/>
+          </p:nvPr>
+        </p:nvSpPr>
+        <p:spPr/>
+        <p:txBody>
+          <a:bodyPr/>
+          <a:lstStyle/>
+          <a:p>
+            <a:r>
+              <a:rPr lang="en-US" dirty="0" smtClean="0"/>
+              <a:t>background</a:t>
+            </a:r>
+            <a:endParaRPr lang="ru-RU" dirty="0"/>
+          </a:p>
+        </p:txBody>
+      </p:sp>
+      <p:sp>
+        <p:nvSpPr>
+          <p:cNvPr id="3" name="Объект 2"/>
+          <p:cNvSpPr>
+            <a:spLocks noGrp="1"/>
+          </p:cNvSpPr>
+          <p:nvPr>
+            <p:ph idx="1"/>
+          </p:nvPr>
+        </p:nvSpPr>
+        <p:spPr/>
+        <p:txBody>
+          <a:bodyPr>
+            <a:normAutofit/>
+          </a:bodyPr>
+          <a:lstStyle/>
+          <a:p>
+            <a:pPr marL="0" indent="0">
+              <a:buNone/>
+            </a:pPr>
+            <a:r>
+              <a:rPr lang="ru-RU" sz="2400" dirty="0" smtClean="0">
+                <a:solidFill>
+                  <a:schemeClr val="bg1">
+                    <a:lumMod val="95000"/>
+                  </a:schemeClr>
+                </a:solidFill>
+              </a:rPr>
+              <a:t>Фон элемента</a:t>
+            </a:r>
+          </a:p>
+          <a:p>
+            <a:pPr marL="0" indent="0">
+              <a:buNone/>
+            </a:pPr>
+            <a:r>
+              <a:rPr lang="en-US" sz="2400" dirty="0" smtClean="0"/>
+              <a:t>background: green;</a:t>
+            </a:r>
+          </a:p>
+          <a:p>
+            <a:pPr marL="0" indent="0">
+              <a:buNone/>
+            </a:pPr>
+            <a:r>
+              <a:rPr lang="en-US" sz="2400" dirty="0"/>
+              <a:t>background-color: #74992e</a:t>
+            </a:r>
+            <a:r>
+              <a:rPr lang="en-US" sz="2400" dirty="0" smtClean="0"/>
+              <a:t>;</a:t>
+            </a:r>
+          </a:p>
+          <a:p>
+            <a:pPr marL="0" indent="0">
+              <a:buNone/>
+            </a:pPr>
+            <a:r>
+              <a:rPr lang="en-US" sz="2400" dirty="0"/>
+              <a:t>background-color: </a:t>
+            </a:r>
+            <a:r>
+              <a:rPr lang="en-US" sz="2400" dirty="0" smtClean="0"/>
+              <a:t>#CCC;</a:t>
+            </a:r>
+            <a:r>
+              <a:rPr lang="ru-RU" sz="2400" dirty="0" smtClean="0"/>
+              <a:t> </a:t>
+            </a:r>
+            <a:r>
+              <a:rPr lang="ru-RU" sz="2400" dirty="0" smtClean="0">
+                <a:solidFill>
+                  <a:schemeClr val="bg1">
+                    <a:lumMod val="95000"/>
+                  </a:schemeClr>
+                </a:solidFill>
+              </a:rPr>
+              <a:t>- серый</a:t>
+            </a:r>
+            <a:endParaRPr lang="en-US" sz="2400" dirty="0" smtClean="0">
+              <a:solidFill>
+                <a:schemeClr val="bg1">
+                  <a:lumMod val="95000"/>
+                </a:schemeClr>
+              </a:solidFill>
+            </a:endParaRPr>
+          </a:p>
+          <a:p>
+            <a:pPr marL="0" indent="0">
+              <a:buNone/>
+            </a:pPr>
+            <a:r>
+              <a:rPr lang="en-US" sz="2400" dirty="0"/>
+              <a:t>background-color: </a:t>
+            </a:r>
+            <a:r>
+              <a:rPr lang="en-US" sz="2400" dirty="0" smtClean="0"/>
+              <a:t>#FFF;</a:t>
+            </a:r>
+            <a:r>
+              <a:rPr lang="ru-RU" sz="2400" dirty="0" smtClean="0"/>
+              <a:t> </a:t>
+            </a:r>
+            <a:r>
+              <a:rPr lang="ru-RU" sz="2400" dirty="0" smtClean="0">
+                <a:solidFill>
+                  <a:schemeClr val="bg1">
+                    <a:lumMod val="95000"/>
+                  </a:schemeClr>
+                </a:solidFill>
+              </a:rPr>
+              <a:t>- белый</a:t>
+            </a:r>
+            <a:endParaRPr lang="en-US" sz="2400" dirty="0" smtClean="0">
+              <a:solidFill>
+                <a:schemeClr val="bg1">
+                  <a:lumMod val="95000"/>
+                </a:schemeClr>
+              </a:solidFill>
+            </a:endParaRPr>
+          </a:p>
+          <a:p>
+            <a:pPr marL="0" indent="0">
+              <a:buNone/>
+            </a:pPr>
+            <a:r>
+              <a:rPr lang="en-US" sz="2400" dirty="0"/>
+              <a:t>background-color: </a:t>
+            </a:r>
+            <a:r>
+              <a:rPr lang="en-US" sz="2400" dirty="0" smtClean="0"/>
+              <a:t>#000; </a:t>
+            </a:r>
+            <a:r>
+              <a:rPr lang="en-US" sz="2400" dirty="0" smtClean="0">
+                <a:solidFill>
+                  <a:schemeClr val="bg1">
+                    <a:lumMod val="95000"/>
+                  </a:schemeClr>
+                </a:solidFill>
+              </a:rPr>
+              <a:t>- </a:t>
+            </a:r>
+            <a:r>
+              <a:rPr lang="ru-RU" sz="2400" dirty="0" smtClean="0">
+                <a:solidFill>
+                  <a:schemeClr val="bg1">
+                    <a:lumMod val="95000"/>
+                  </a:schemeClr>
+                </a:solidFill>
+              </a:rPr>
+              <a:t>черный</a:t>
+            </a:r>
+            <a:endParaRPr lang="en-US" sz="2400" dirty="0">
+              <a:solidFill>
+                <a:schemeClr val="bg1">
+                  <a:lumMod val="95000"/>
+                </a:schemeClr>
+              </a:solidFill>
+            </a:endParaRPr>
+          </a:p>
+          <a:p>
+            <a:pPr marL="0" indent="0">
+              <a:buNone/>
+            </a:pPr>
+            <a:r>
+              <a:rPr lang="en-US" sz="2400" dirty="0"/>
+              <a:t>background-color: </a:t>
+            </a:r>
+            <a:r>
+              <a:rPr lang="en-US" sz="2400" dirty="0" err="1"/>
+              <a:t>rgb</a:t>
+            </a:r>
+            <a:r>
+              <a:rPr lang="en-US" sz="2400" dirty="0"/>
+              <a:t>(255, 255, 128);</a:t>
+            </a:r>
+          </a:p>
+          <a:p>
+            <a:pPr marL="0" indent="0">
+              <a:buNone/>
+            </a:pPr>
+            <a:r>
+              <a:rPr lang="en-US" sz="2400" dirty="0"/>
+              <a:t>background-color: </a:t>
+            </a:r>
+            <a:r>
+              <a:rPr lang="en-US" sz="2400" dirty="0" err="1"/>
+              <a:t>rgba</a:t>
+            </a:r>
+            <a:r>
+              <a:rPr lang="en-US" sz="2400" dirty="0"/>
+              <a:t>(255, 255, 128, .5</a:t>
+            </a:r>
+            <a:r>
+              <a:rPr lang="en-US" sz="2400" dirty="0" smtClean="0"/>
+              <a:t>);</a:t>
+            </a:r>
+            <a:endParaRPr lang="en-US" sz="2400" dirty="0"/>
+          </a:p>
+          <a:p>
+            <a:pPr marL="0" indent="0">
+              <a:buNone/>
+            </a:pPr>
+            <a:r>
+              <a:rPr lang="en-US" sz="2400" dirty="0" smtClean="0"/>
+              <a:t>background: content-box </a:t>
+            </a:r>
+            <a:r>
+              <a:rPr lang="en-US" sz="2400" dirty="0"/>
+              <a:t>radial-gradient(crimson, </a:t>
+            </a:r>
+            <a:r>
+              <a:rPr lang="en-US" sz="2400" dirty="0" err="1"/>
+              <a:t>skyblue</a:t>
+            </a:r>
+            <a:r>
+              <a:rPr lang="en-US" sz="2400" dirty="0"/>
+              <a:t>);</a:t>
+            </a:r>
+          </a:p>
+          <a:p>
+            <a:pPr marL="0" indent="0">
+              <a:buNone/>
+            </a:pPr>
+            <a:r>
+              <a:rPr lang="en-US" sz="2400" dirty="0" smtClean="0"/>
+              <a:t>background: no-repeat </a:t>
+            </a:r>
+            <a:r>
+              <a:rPr lang="en-US" sz="2400" dirty="0" err="1" smtClean="0"/>
+              <a:t>url</a:t>
+            </a:r>
+            <a:r>
+              <a:rPr lang="en-US" sz="2400" dirty="0"/>
+              <a:t>("../../media/examples/lizard.png</a:t>
+            </a:r>
+            <a:r>
+              <a:rPr lang="en-US" sz="2400" dirty="0" smtClean="0"/>
+              <a:t>");</a:t>
+            </a:r>
+          </a:p>
+        </p:txBody>
+      </p:sp>
+    </p:spTree>
+    <p:extLst>
+      <p:ext uri="{BB962C8B-B14F-4D97-AF65-F5344CB8AC3E}">
+        <p14:creationId xmlns:p14="http://schemas.microsoft.com/office/powerpoint/2010/main" val="3177847145"/>
+      </p:ext>
+    </p:extLst>
+  </p:cSld>
+  <p:clrMapOvr>
+    <a:masterClrMapping/>
+  </p:clrMapOvr>
+</p:sld>
+</file>
+
+<file path=ppt/slides/slide27.xml><?xml version="1.0" encoding="utf-8"?>
+<p:sld xmlns:a="http://schemas.openxmlformats.org/drawingml/2006/main" xmlns:r="http://schemas.openxmlformats.org/officeDocument/2006/relationships" xmlns:p="http://schemas.openxmlformats.org/presentationml/2006/main">
+  <p:cSld>
+    <p:bg>
+      <p:bgPr>
+        <a:solidFill>
+          <a:srgbClr val="8BC34A"/>
+        </a:solidFill>
+        <a:effectLst/>
+      </p:bgPr>
+    </p:bg>
+    <p:spTree>
+      <p:nvGrpSpPr>
+        <p:cNvPr id="1" name=""/>
+        <p:cNvGrpSpPr/>
+        <p:nvPr/>
+      </p:nvGrpSpPr>
+      <p:grpSpPr>
+        <a:xfrm>
+          <a:off x="0" y="0"/>
+          <a:ext cx="0" cy="0"/>
+          <a:chOff x="0" y="0"/>
+          <a:chExt cx="0" cy="0"/>
+        </a:xfrm>
+      </p:grpSpPr>
+      <p:sp>
+        <p:nvSpPr>
+          <p:cNvPr id="2" name="Заголовок 1"/>
+          <p:cNvSpPr>
+            <a:spLocks noGrp="1"/>
+          </p:cNvSpPr>
+          <p:nvPr>
+            <p:ph type="title"/>
+          </p:nvPr>
+        </p:nvSpPr>
+        <p:spPr/>
+        <p:txBody>
+          <a:bodyPr/>
+          <a:lstStyle/>
+          <a:p>
+            <a:r>
+              <a:rPr lang="en-US" dirty="0"/>
+              <a:t>c</a:t>
+            </a:r>
+            <a:r>
+              <a:rPr lang="en-US" dirty="0" smtClean="0"/>
+              <a:t>olor</a:t>
+            </a:r>
+            <a:endParaRPr lang="ru-RU" dirty="0"/>
+          </a:p>
+        </p:txBody>
+      </p:sp>
+      <p:sp>
+        <p:nvSpPr>
+          <p:cNvPr id="3" name="Объект 2"/>
+          <p:cNvSpPr>
+            <a:spLocks noGrp="1"/>
+          </p:cNvSpPr>
+          <p:nvPr>
+            <p:ph idx="1"/>
+          </p:nvPr>
+        </p:nvSpPr>
+        <p:spPr/>
+        <p:txBody>
+          <a:bodyPr>
+            <a:normAutofit lnSpcReduction="10000"/>
+          </a:bodyPr>
+          <a:lstStyle/>
+          <a:p>
+            <a:pPr marL="0" indent="0">
+              <a:buNone/>
+            </a:pPr>
+            <a:r>
+              <a:rPr lang="ru-RU" dirty="0" smtClean="0">
+                <a:solidFill>
+                  <a:schemeClr val="bg1">
+                    <a:lumMod val="95000"/>
+                  </a:schemeClr>
+                </a:solidFill>
+              </a:rPr>
+              <a:t>Цвет текста. Ссылки не наследуют цвет текста.</a:t>
+            </a:r>
+          </a:p>
+          <a:p>
+            <a:pPr marL="0" indent="0">
+              <a:buNone/>
+            </a:pPr>
+            <a:r>
+              <a:rPr lang="en-US" dirty="0" smtClean="0"/>
+              <a:t>color: </a:t>
+            </a:r>
+            <a:r>
+              <a:rPr lang="en-US" dirty="0"/>
+              <a:t>green;</a:t>
+            </a:r>
+          </a:p>
+          <a:p>
+            <a:pPr marL="0" indent="0">
+              <a:buNone/>
+            </a:pPr>
+            <a:r>
+              <a:rPr lang="en-US" dirty="0" smtClean="0"/>
+              <a:t>color</a:t>
+            </a:r>
+            <a:r>
+              <a:rPr lang="en-US" dirty="0"/>
+              <a:t>: #74992e;</a:t>
+            </a:r>
+          </a:p>
+          <a:p>
+            <a:pPr marL="0" indent="0">
+              <a:buNone/>
+            </a:pPr>
+            <a:r>
+              <a:rPr lang="en-US" dirty="0" smtClean="0"/>
+              <a:t>color</a:t>
+            </a:r>
+            <a:r>
+              <a:rPr lang="en-US" dirty="0"/>
+              <a:t>: #CCC;</a:t>
+            </a:r>
+            <a:r>
+              <a:rPr lang="ru-RU" dirty="0"/>
+              <a:t> </a:t>
+            </a:r>
+            <a:r>
+              <a:rPr lang="ru-RU" dirty="0">
+                <a:solidFill>
+                  <a:schemeClr val="bg1">
+                    <a:lumMod val="95000"/>
+                  </a:schemeClr>
+                </a:solidFill>
+              </a:rPr>
+              <a:t>- серый</a:t>
+            </a:r>
+            <a:endParaRPr lang="en-US" dirty="0">
+              <a:solidFill>
+                <a:schemeClr val="bg1">
+                  <a:lumMod val="95000"/>
+                </a:schemeClr>
+              </a:solidFill>
+            </a:endParaRPr>
+          </a:p>
+          <a:p>
+            <a:pPr marL="0" indent="0">
+              <a:buNone/>
+            </a:pPr>
+            <a:r>
+              <a:rPr lang="en-US" dirty="0" smtClean="0"/>
+              <a:t>color</a:t>
+            </a:r>
+            <a:r>
+              <a:rPr lang="en-US" dirty="0"/>
+              <a:t>: #FFF;</a:t>
+            </a:r>
+            <a:r>
+              <a:rPr lang="ru-RU" dirty="0"/>
+              <a:t> </a:t>
+            </a:r>
+            <a:r>
+              <a:rPr lang="ru-RU" dirty="0">
+                <a:solidFill>
+                  <a:schemeClr val="bg1">
+                    <a:lumMod val="95000"/>
+                  </a:schemeClr>
+                </a:solidFill>
+              </a:rPr>
+              <a:t>- белый</a:t>
+            </a:r>
+            <a:endParaRPr lang="en-US" dirty="0">
+              <a:solidFill>
+                <a:schemeClr val="bg1">
+                  <a:lumMod val="95000"/>
+                </a:schemeClr>
+              </a:solidFill>
+            </a:endParaRPr>
+          </a:p>
+          <a:p>
+            <a:pPr marL="0" indent="0">
+              <a:buNone/>
+            </a:pPr>
+            <a:r>
+              <a:rPr lang="en-US" dirty="0" smtClean="0"/>
+              <a:t>color</a:t>
+            </a:r>
+            <a:r>
+              <a:rPr lang="en-US" dirty="0"/>
+              <a:t>: #000; </a:t>
+            </a:r>
+            <a:r>
+              <a:rPr lang="en-US" dirty="0">
+                <a:solidFill>
+                  <a:schemeClr val="bg1">
+                    <a:lumMod val="95000"/>
+                  </a:schemeClr>
+                </a:solidFill>
+              </a:rPr>
+              <a:t>- </a:t>
+            </a:r>
+            <a:r>
+              <a:rPr lang="ru-RU" dirty="0">
+                <a:solidFill>
+                  <a:schemeClr val="bg1">
+                    <a:lumMod val="95000"/>
+                  </a:schemeClr>
+                </a:solidFill>
+              </a:rPr>
+              <a:t>черный</a:t>
+            </a:r>
+            <a:endParaRPr lang="en-US" dirty="0">
+              <a:solidFill>
+                <a:schemeClr val="bg1">
+                  <a:lumMod val="95000"/>
+                </a:schemeClr>
+              </a:solidFill>
+            </a:endParaRPr>
+          </a:p>
+          <a:p>
+            <a:pPr marL="0" indent="0">
+              <a:buNone/>
+            </a:pPr>
+            <a:r>
+              <a:rPr lang="en-US" dirty="0" smtClean="0"/>
+              <a:t>color</a:t>
+            </a:r>
+            <a:r>
+              <a:rPr lang="en-US" dirty="0"/>
+              <a:t>: </a:t>
+            </a:r>
+            <a:r>
+              <a:rPr lang="en-US" dirty="0" err="1"/>
+              <a:t>rgb</a:t>
+            </a:r>
+            <a:r>
+              <a:rPr lang="en-US" dirty="0"/>
+              <a:t>(255, 255, 128);</a:t>
+            </a:r>
+          </a:p>
+          <a:p>
+            <a:pPr marL="0" indent="0">
+              <a:buNone/>
+            </a:pPr>
+            <a:r>
+              <a:rPr lang="en-US" dirty="0" smtClean="0"/>
+              <a:t>color</a:t>
+            </a:r>
+            <a:r>
+              <a:rPr lang="en-US" dirty="0"/>
+              <a:t>: </a:t>
+            </a:r>
+            <a:r>
+              <a:rPr lang="en-US" dirty="0" err="1"/>
+              <a:t>rgba</a:t>
+            </a:r>
+            <a:r>
+              <a:rPr lang="en-US" dirty="0"/>
+              <a:t>(255, 255, 128, .5);</a:t>
+            </a:r>
+          </a:p>
+          <a:p>
+            <a:endParaRPr lang="ru-RU" dirty="0" smtClean="0"/>
+          </a:p>
+        </p:txBody>
+      </p:sp>
+    </p:spTree>
+    <p:extLst>
+      <p:ext uri="{BB962C8B-B14F-4D97-AF65-F5344CB8AC3E}">
+        <p14:creationId xmlns:p14="http://schemas.microsoft.com/office/powerpoint/2010/main" val="3254660631"/>
+      </p:ext>
+    </p:extLst>
+  </p:cSld>
+  <p:clrMapOvr>
+    <a:masterClrMapping/>
+  </p:clrMapOvr>
+</p:sld>
+</file>
+
+<file path=ppt/slides/slide28.xml><?xml version="1.0" encoding="utf-8"?>
+<p:sld xmlns:a="http://schemas.openxmlformats.org/drawingml/2006/main" xmlns:r="http://schemas.openxmlformats.org/officeDocument/2006/relationships" xmlns:p="http://schemas.openxmlformats.org/presentationml/2006/main">
+  <p:cSld>
+    <p:bg>
+      <p:bgPr>
+        <a:solidFill>
+          <a:srgbClr val="8BC34A"/>
+        </a:solidFill>
+        <a:effectLst/>
+      </p:bgPr>
+    </p:bg>
+    <p:spTree>
+      <p:nvGrpSpPr>
+        <p:cNvPr id="1" name=""/>
+        <p:cNvGrpSpPr/>
+        <p:nvPr/>
+      </p:nvGrpSpPr>
+      <p:grpSpPr>
+        <a:xfrm>
+          <a:off x="0" y="0"/>
+          <a:ext cx="0" cy="0"/>
+          <a:chOff x="0" y="0"/>
+          <a:chExt cx="0" cy="0"/>
+        </a:xfrm>
+      </p:grpSpPr>
+      <p:sp>
+        <p:nvSpPr>
+          <p:cNvPr id="2" name="Заголовок 1"/>
+          <p:cNvSpPr>
+            <a:spLocks noGrp="1"/>
+          </p:cNvSpPr>
+          <p:nvPr>
+            <p:ph type="title"/>
+          </p:nvPr>
+        </p:nvSpPr>
+        <p:spPr/>
+        <p:txBody>
+          <a:bodyPr/>
+          <a:lstStyle/>
+          <a:p>
+            <a:r>
+              <a:rPr lang="en-US" dirty="0" smtClean="0"/>
+              <a:t>text-decoration</a:t>
+            </a:r>
+            <a:endParaRPr lang="ru-RU" dirty="0"/>
+          </a:p>
+        </p:txBody>
+      </p:sp>
+      <p:sp>
+        <p:nvSpPr>
+          <p:cNvPr id="3" name="Объект 2"/>
+          <p:cNvSpPr>
+            <a:spLocks noGrp="1"/>
+          </p:cNvSpPr>
+          <p:nvPr>
+            <p:ph idx="1"/>
+          </p:nvPr>
+        </p:nvSpPr>
+        <p:spPr/>
+        <p:txBody>
+          <a:bodyPr>
+            <a:normAutofit fontScale="77500" lnSpcReduction="20000"/>
+          </a:bodyPr>
+          <a:lstStyle/>
+          <a:p>
+            <a:pPr marL="0" indent="0">
+              <a:buNone/>
+            </a:pPr>
+            <a:r>
+              <a:rPr lang="en-US" dirty="0" smtClean="0"/>
+              <a:t>/* </a:t>
+            </a:r>
+            <a:r>
+              <a:rPr lang="ru-RU" dirty="0" smtClean="0"/>
+              <a:t>перечеркнутый текст </a:t>
+            </a:r>
+            <a:r>
+              <a:rPr lang="en-US" dirty="0" smtClean="0"/>
+              <a:t>*/</a:t>
+            </a:r>
+          </a:p>
+          <a:p>
+            <a:pPr marL="0" indent="0">
+              <a:buNone/>
+            </a:pPr>
+            <a:r>
+              <a:rPr lang="en-US" dirty="0" smtClean="0"/>
+              <a:t>text-decoration</a:t>
+            </a:r>
+            <a:r>
+              <a:rPr lang="en-US" dirty="0"/>
+              <a:t>: </a:t>
+            </a:r>
+            <a:r>
+              <a:rPr lang="en-US" dirty="0" smtClean="0"/>
+              <a:t>line-through;</a:t>
+            </a:r>
+            <a:endParaRPr lang="ru-RU" dirty="0" smtClean="0"/>
+          </a:p>
+          <a:p>
+            <a:pPr marL="0" indent="0">
+              <a:buNone/>
+            </a:pPr>
+            <a:endParaRPr lang="ru-RU" dirty="0"/>
+          </a:p>
+          <a:p>
+            <a:pPr marL="0" indent="0">
+              <a:buNone/>
+            </a:pPr>
+            <a:r>
+              <a:rPr lang="ru-RU" dirty="0" smtClean="0"/>
+              <a:t>/* линия над текстом */</a:t>
+            </a:r>
+            <a:endParaRPr lang="en-US" dirty="0" smtClean="0"/>
+          </a:p>
+          <a:p>
+            <a:pPr marL="0" indent="0">
+              <a:buNone/>
+            </a:pPr>
+            <a:r>
+              <a:rPr lang="en-US" dirty="0" smtClean="0"/>
+              <a:t>text-decoration: </a:t>
+            </a:r>
+            <a:r>
+              <a:rPr lang="en-US" dirty="0" err="1" smtClean="0"/>
+              <a:t>overline</a:t>
+            </a:r>
+            <a:r>
+              <a:rPr lang="en-US" dirty="0" smtClean="0"/>
+              <a:t>;</a:t>
+            </a:r>
+            <a:endParaRPr lang="ru-RU" dirty="0" smtClean="0"/>
+          </a:p>
+          <a:p>
+            <a:pPr marL="0" indent="0">
+              <a:buNone/>
+            </a:pPr>
+            <a:endParaRPr lang="ru-RU" dirty="0"/>
+          </a:p>
+          <a:p>
+            <a:pPr marL="0" indent="0">
+              <a:buNone/>
+            </a:pPr>
+            <a:r>
+              <a:rPr lang="ru-RU" dirty="0" smtClean="0"/>
+              <a:t>/* линия под текстом */</a:t>
+            </a:r>
+            <a:endParaRPr lang="en-US" dirty="0" smtClean="0"/>
+          </a:p>
+          <a:p>
+            <a:pPr marL="0" indent="0">
+              <a:buNone/>
+            </a:pPr>
+            <a:r>
+              <a:rPr lang="en-US" dirty="0"/>
+              <a:t>text-decoration: </a:t>
+            </a:r>
+            <a:r>
+              <a:rPr lang="en-US" dirty="0" smtClean="0"/>
+              <a:t>underline;</a:t>
+            </a:r>
+            <a:endParaRPr lang="ru-RU" dirty="0" smtClean="0"/>
+          </a:p>
+          <a:p>
+            <a:pPr marL="0" indent="0">
+              <a:buNone/>
+            </a:pPr>
+            <a:endParaRPr lang="ru-RU" dirty="0"/>
+          </a:p>
+          <a:p>
+            <a:pPr marL="0" indent="0">
+              <a:buNone/>
+            </a:pPr>
+            <a:r>
+              <a:rPr lang="ru-RU" dirty="0" smtClean="0"/>
+              <a:t>/* отменяет все эффекты </a:t>
+            </a:r>
+            <a:r>
+              <a:rPr lang="en-US" dirty="0" smtClean="0"/>
+              <a:t>text-decoration, </a:t>
+            </a:r>
+            <a:r>
+              <a:rPr lang="ru-RU" dirty="0" smtClean="0"/>
+              <a:t>в том числе подчеркивание ссылок */</a:t>
+            </a:r>
+            <a:endParaRPr lang="en-US" dirty="0" smtClean="0"/>
+          </a:p>
+          <a:p>
+            <a:pPr marL="0" indent="0">
+              <a:buNone/>
+            </a:pPr>
+            <a:r>
+              <a:rPr lang="en-US" dirty="0"/>
+              <a:t>text-decoration: </a:t>
+            </a:r>
+            <a:r>
+              <a:rPr lang="en-US" dirty="0" smtClean="0"/>
+              <a:t>none;</a:t>
+            </a:r>
+            <a:endParaRPr lang="en-US" dirty="0"/>
+          </a:p>
+        </p:txBody>
+      </p:sp>
+    </p:spTree>
+    <p:extLst>
+      <p:ext uri="{BB962C8B-B14F-4D97-AF65-F5344CB8AC3E}">
+        <p14:creationId xmlns:p14="http://schemas.microsoft.com/office/powerpoint/2010/main" val="3077643884"/>
+      </p:ext>
+    </p:extLst>
+  </p:cSld>
+  <p:clrMapOvr>
+    <a:masterClrMapping/>
+  </p:clrMapOvr>
+</p:sld>
+</file>
+
+<file path=ppt/slides/slide29.xml><?xml version="1.0" encoding="utf-8"?>
+<p:sld xmlns:a="http://schemas.openxmlformats.org/drawingml/2006/main" xmlns:r="http://schemas.openxmlformats.org/officeDocument/2006/relationships" xmlns:p="http://schemas.openxmlformats.org/presentationml/2006/main">
+  <p:cSld>
+    <p:bg>
+      <p:bgPr>
+        <a:solidFill>
+          <a:srgbClr val="8BC34A"/>
+        </a:solidFill>
+        <a:effectLst/>
+      </p:bgPr>
+    </p:bg>
+    <p:spTree>
+      <p:nvGrpSpPr>
+        <p:cNvPr id="1" name=""/>
+        <p:cNvGrpSpPr/>
+        <p:nvPr/>
+      </p:nvGrpSpPr>
+      <p:grpSpPr>
+        <a:xfrm>
+          <a:off x="0" y="0"/>
+          <a:ext cx="0" cy="0"/>
+          <a:chOff x="0" y="0"/>
+          <a:chExt cx="0" cy="0"/>
+        </a:xfrm>
+      </p:grpSpPr>
+      <p:sp>
+        <p:nvSpPr>
+          <p:cNvPr id="2" name="Заголовок 1"/>
+          <p:cNvSpPr>
+            <a:spLocks noGrp="1"/>
+          </p:cNvSpPr>
+          <p:nvPr>
+            <p:ph type="title"/>
+          </p:nvPr>
+        </p:nvSpPr>
+        <p:spPr/>
+        <p:txBody>
+          <a:bodyPr/>
+          <a:lstStyle/>
+          <a:p>
+            <a:r>
+              <a:rPr lang="en-US" dirty="0" smtClean="0"/>
+              <a:t>list-style</a:t>
+            </a:r>
+            <a:endParaRPr lang="ru-RU" dirty="0"/>
+          </a:p>
+        </p:txBody>
+      </p:sp>
+      <p:sp>
+        <p:nvSpPr>
+          <p:cNvPr id="3" name="Объект 2"/>
+          <p:cNvSpPr>
+            <a:spLocks noGrp="1"/>
+          </p:cNvSpPr>
+          <p:nvPr>
+            <p:ph idx="1"/>
+          </p:nvPr>
+        </p:nvSpPr>
+        <p:spPr/>
+        <p:txBody>
+          <a:bodyPr/>
+          <a:lstStyle/>
+          <a:p>
+            <a:pPr marL="0" indent="0">
+              <a:buNone/>
+            </a:pPr>
+            <a:r>
+              <a:rPr lang="en-US" dirty="0">
+                <a:hlinkClick r:id="rId2"/>
+              </a:rPr>
+              <a:t>http://</a:t>
+            </a:r>
+            <a:r>
+              <a:rPr lang="en-US" dirty="0" smtClean="0">
+                <a:hlinkClick r:id="rId2"/>
+              </a:rPr>
+              <a:t>htmlbook.ru/css/list-style</a:t>
+            </a:r>
+            <a:endParaRPr lang="en-US" dirty="0" smtClean="0"/>
+          </a:p>
+          <a:p>
+            <a:pPr marL="0" indent="0">
+              <a:buNone/>
+            </a:pPr>
+            <a:endParaRPr lang="en-US" dirty="0"/>
+          </a:p>
+          <a:p>
+            <a:pPr marL="0" indent="0">
+              <a:buNone/>
+            </a:pPr>
+            <a:r>
+              <a:rPr lang="ru-RU" dirty="0"/>
+              <a:t>Универсальное свойство, позволяющее одновременно задать стиль маркера, его положение, а также изображение, которое будет использоваться в качестве маркера</a:t>
+            </a:r>
+            <a:r>
+              <a:rPr lang="ru-RU" dirty="0" smtClean="0"/>
+              <a:t>.</a:t>
+            </a:r>
+            <a:endParaRPr lang="en-US" dirty="0" smtClean="0"/>
+          </a:p>
+          <a:p>
+            <a:pPr marL="0" indent="0">
+              <a:buNone/>
+            </a:pPr>
+            <a:endParaRPr lang="en-US" dirty="0"/>
+          </a:p>
+          <a:p>
+            <a:pPr marL="0" indent="0">
+              <a:buNone/>
+            </a:pPr>
+            <a:r>
+              <a:rPr lang="en-US" dirty="0" smtClean="0">
+                <a:solidFill>
+                  <a:schemeClr val="bg1">
+                    <a:lumMod val="95000"/>
+                  </a:schemeClr>
+                </a:solidFill>
+              </a:rPr>
+              <a:t>list-style: none;</a:t>
+            </a:r>
+            <a:endParaRPr lang="ru-RU" dirty="0">
+              <a:solidFill>
+                <a:schemeClr val="bg1">
+                  <a:lumMod val="95000"/>
+                </a:schemeClr>
+              </a:solidFill>
+            </a:endParaRPr>
+          </a:p>
+        </p:txBody>
+      </p:sp>
+    </p:spTree>
+    <p:extLst>
+      <p:ext uri="{BB962C8B-B14F-4D97-AF65-F5344CB8AC3E}">
+        <p14:creationId xmlns:p14="http://schemas.microsoft.com/office/powerpoint/2010/main" val="1157316648"/>
       </p:ext>
     </p:extLst>
   </p:cSld>
@@ -6114,6 +7801,148 @@
     <p:extLst>
       <p:ext uri="{BB962C8B-B14F-4D97-AF65-F5344CB8AC3E}">
         <p14:creationId xmlns:p14="http://schemas.microsoft.com/office/powerpoint/2010/main" val="26205051"/>
+      </p:ext>
+    </p:extLst>
+  </p:cSld>
+  <p:clrMapOvr>
+    <a:masterClrMapping/>
+  </p:clrMapOvr>
+</p:sld>
+</file>
+
+<file path=ppt/slides/slide30.xml><?xml version="1.0" encoding="utf-8"?>
+<p:sld xmlns:a="http://schemas.openxmlformats.org/drawingml/2006/main" xmlns:r="http://schemas.openxmlformats.org/officeDocument/2006/relationships" xmlns:p="http://schemas.openxmlformats.org/presentationml/2006/main">
+  <p:cSld>
+    <p:bg>
+      <p:bgPr>
+        <a:blipFill dpi="0" rotWithShape="1">
+          <a:blip r:embed="rId2">
+            <a:lum/>
+          </a:blip>
+          <a:srcRect/>
+          <a:stretch>
+            <a:fillRect/>
+          </a:stretch>
+        </a:blipFill>
+        <a:effectLst/>
+      </p:bgPr>
+    </p:bg>
+    <p:spTree>
+      <p:nvGrpSpPr>
+        <p:cNvPr id="1" name=""/>
+        <p:cNvGrpSpPr/>
+        <p:nvPr/>
+      </p:nvGrpSpPr>
+      <p:grpSpPr>
+        <a:xfrm>
+          <a:off x="0" y="0"/>
+          <a:ext cx="0" cy="0"/>
+          <a:chOff x="0" y="0"/>
+          <a:chExt cx="0" cy="0"/>
+        </a:xfrm>
+      </p:grpSpPr>
+    </p:spTree>
+    <p:extLst>
+      <p:ext uri="{BB962C8B-B14F-4D97-AF65-F5344CB8AC3E}">
+        <p14:creationId xmlns:p14="http://schemas.microsoft.com/office/powerpoint/2010/main" val="1242956479"/>
+      </p:ext>
+    </p:extLst>
+  </p:cSld>
+  <p:clrMapOvr>
+    <a:masterClrMapping/>
+  </p:clrMapOvr>
+</p:sld>
+</file>
+
+<file path=ppt/slides/slide31.xml><?xml version="1.0" encoding="utf-8"?>
+<p:sld xmlns:a="http://schemas.openxmlformats.org/drawingml/2006/main" xmlns:r="http://schemas.openxmlformats.org/officeDocument/2006/relationships" xmlns:p="http://schemas.openxmlformats.org/presentationml/2006/main">
+  <p:cSld>
+    <p:bg>
+      <p:bgPr>
+        <a:solidFill>
+          <a:srgbClr val="8BC34A"/>
+        </a:solidFill>
+        <a:effectLst/>
+      </p:bgPr>
+    </p:bg>
+    <p:spTree>
+      <p:nvGrpSpPr>
+        <p:cNvPr id="1" name=""/>
+        <p:cNvGrpSpPr/>
+        <p:nvPr/>
+      </p:nvGrpSpPr>
+      <p:grpSpPr>
+        <a:xfrm>
+          <a:off x="0" y="0"/>
+          <a:ext cx="0" cy="0"/>
+          <a:chOff x="0" y="0"/>
+          <a:chExt cx="0" cy="0"/>
+        </a:xfrm>
+      </p:grpSpPr>
+      <p:sp>
+        <p:nvSpPr>
+          <p:cNvPr id="2" name="Заголовок 1"/>
+          <p:cNvSpPr>
+            <a:spLocks noGrp="1"/>
+          </p:cNvSpPr>
+          <p:nvPr>
+            <p:ph type="title"/>
+          </p:nvPr>
+        </p:nvSpPr>
+        <p:spPr/>
+        <p:txBody>
+          <a:bodyPr/>
+          <a:lstStyle/>
+          <a:p>
+            <a:r>
+              <a:rPr lang="ru-RU" dirty="0" smtClean="0"/>
+              <a:t>Домашнее задание</a:t>
+            </a:r>
+            <a:endParaRPr lang="ru-RU" dirty="0"/>
+          </a:p>
+        </p:txBody>
+      </p:sp>
+      <p:sp>
+        <p:nvSpPr>
+          <p:cNvPr id="3" name="Объект 2"/>
+          <p:cNvSpPr>
+            <a:spLocks noGrp="1"/>
+          </p:cNvSpPr>
+          <p:nvPr>
+            <p:ph idx="1"/>
+          </p:nvPr>
+        </p:nvSpPr>
+        <p:spPr/>
+        <p:txBody>
+          <a:bodyPr/>
+          <a:lstStyle/>
+          <a:p>
+            <a:r>
+              <a:rPr lang="ru-RU" dirty="0" smtClean="0"/>
+              <a:t>1. Карточки 10-14. Разбить на блоки. Написать </a:t>
+            </a:r>
+            <a:r>
+              <a:rPr lang="en-US" dirty="0" smtClean="0"/>
+              <a:t>html </a:t>
+            </a:r>
+            <a:r>
+              <a:rPr lang="ru-RU" dirty="0" smtClean="0"/>
+              <a:t>разметку.</a:t>
+            </a:r>
+          </a:p>
+          <a:p>
+            <a:r>
+              <a:rPr lang="ru-RU" dirty="0" smtClean="0"/>
+              <a:t>2. Выполнить ремонт верстки по шаблону.</a:t>
+            </a:r>
+            <a:endParaRPr lang="ru-RU" dirty="0"/>
+          </a:p>
+        </p:txBody>
+      </p:sp>
+    </p:spTree>
+    <p:extLst>
+      <p:ext uri="{BB962C8B-B14F-4D97-AF65-F5344CB8AC3E}">
+        <p14:creationId xmlns:p14="http://schemas.microsoft.com/office/powerpoint/2010/main" val="2593986774"/>
       </p:ext>
     </p:extLst>
   </p:cSld>

</xml_diff>